<commit_message>
renamed package: defaults.progmodel -> progmodels.dflt so that packages consistent with Maven modules
git-svn-id: https://svn.apache.org/repos/asf/incubator/isis/trunk@1078548 13f79535-47bb-0310-9956-ffa450edef68
</commit_message>
<xml_diff>
--- a/src/site/resources/presentations/IntroducingApacheIsis.pptx
+++ b/src/site/resources/presentations/IntroducingApacheIsis.pptx
@@ -7030,882 +7030,6 @@
       <dsp:cNvGrpSpPr/>
     </dsp:nvGrpSpPr>
     <dsp:grpSpPr/>
-    <dsp:sp modelId="{7E9DE110-E9AD-4729-A2D7-E9BE91CEE8A3}">
-      <dsp:nvSpPr>
-        <dsp:cNvPr id="0" name=""/>
-        <dsp:cNvSpPr/>
-      </dsp:nvSpPr>
-      <dsp:spPr>
-        <a:xfrm>
-          <a:off x="0" y="309183"/>
-          <a:ext cx="8215370" cy="1346625"/>
-        </a:xfrm>
-        <a:prstGeom prst="rect">
-          <a:avLst/>
-        </a:prstGeom>
-        <a:solidFill>
-          <a:schemeClr val="lt1">
-            <a:alpha val="90000"/>
-            <a:hueOff val="0"/>
-            <a:satOff val="0"/>
-            <a:lumOff val="0"/>
-            <a:alphaOff val="0"/>
-          </a:schemeClr>
-        </a:solidFill>
-        <a:ln w="9525" cap="flat" cmpd="sng" algn="ctr">
-          <a:solidFill>
-            <a:schemeClr val="accent2">
-              <a:hueOff val="0"/>
-              <a:satOff val="0"/>
-              <a:lumOff val="0"/>
-              <a:alphaOff val="0"/>
-            </a:schemeClr>
-          </a:solidFill>
-          <a:prstDash val="solid"/>
-        </a:ln>
-        <a:effectLst>
-          <a:outerShdw blurRad="40000" dist="23000" dir="5400000" rotWithShape="0">
-            <a:srgbClr val="000000">
-              <a:alpha val="35000"/>
-            </a:srgbClr>
-          </a:outerShdw>
-        </a:effectLst>
-        <a:scene3d>
-          <a:camera prst="orthographicFront"/>
-          <a:lightRig rig="flat" dir="t"/>
-        </a:scene3d>
-        <a:sp3d z="190500" extrusionH="12700" prstMaterial="plastic">
-          <a:bevelT w="50800" h="50800"/>
-        </a:sp3d>
-      </dsp:spPr>
-      <dsp:style>
-        <a:lnRef idx="1">
-          <a:scrgbClr r="0" g="0" b="0"/>
-        </a:lnRef>
-        <a:fillRef idx="1">
-          <a:scrgbClr r="0" g="0" b="0"/>
-        </a:fillRef>
-        <a:effectRef idx="2">
-          <a:scrgbClr r="0" g="0" b="0"/>
-        </a:effectRef>
-        <a:fontRef idx="minor"/>
-      </dsp:style>
-      <dsp:txBody>
-        <a:bodyPr spcFirstLastPara="0" vert="horz" wrap="square" lIns="637604" tIns="312420" rIns="637604" bIns="106680" numCol="1" spcCol="1270" anchor="t" anchorCtr="0">
-          <a:noAutofit/>
-        </a:bodyPr>
-        <a:lstStyle/>
-        <a:p>
-          <a:pPr marL="114300" lvl="1" indent="-114300" algn="l" defTabSz="666750">
-            <a:lnSpc>
-              <a:spcPct val="90000"/>
-            </a:lnSpc>
-            <a:spcBef>
-              <a:spcPct val="0"/>
-            </a:spcBef>
-            <a:spcAft>
-              <a:spcPct val="15000"/>
-            </a:spcAft>
-            <a:buChar char="••"/>
-          </a:pPr>
-          <a:r>
-            <a:rPr lang="en-US" sz="1500" kern="1200" dirty="0" smtClean="0"/>
-            <a:t>One of the purest examples of domain-driven design for a large-scale transactional business application, anywhere in the world</a:t>
-          </a:r>
-          <a:endParaRPr lang="en-GB" sz="1500" kern="1200" dirty="0"/>
-        </a:p>
-        <a:p>
-          <a:pPr marL="114300" lvl="1" indent="-114300" algn="l" defTabSz="666750">
-            <a:lnSpc>
-              <a:spcPct val="90000"/>
-            </a:lnSpc>
-            <a:spcBef>
-              <a:spcPct val="0"/>
-            </a:spcBef>
-            <a:spcAft>
-              <a:spcPct val="15000"/>
-            </a:spcAft>
-            <a:buChar char="••"/>
-          </a:pPr>
-          <a:r>
-            <a:rPr lang="en-US" sz="1500" kern="1200" dirty="0" smtClean="0"/>
-            <a:t>Extreme re-use and sharing of objects between applications</a:t>
-          </a:r>
-          <a:endParaRPr lang="en-GB" sz="1500" kern="1200" dirty="0"/>
-        </a:p>
-        <a:p>
-          <a:pPr marL="114300" lvl="1" indent="-114300" algn="l" defTabSz="666750">
-            <a:lnSpc>
-              <a:spcPct val="90000"/>
-            </a:lnSpc>
-            <a:spcBef>
-              <a:spcPct val="0"/>
-            </a:spcBef>
-            <a:spcAft>
-              <a:spcPct val="15000"/>
-            </a:spcAft>
-            <a:buChar char="••"/>
-          </a:pPr>
-          <a:r>
-            <a:rPr lang="en-GB" sz="1500" kern="1200" dirty="0" smtClean="0"/>
-            <a:t>Enables easy modification in response to changing business requirements</a:t>
-          </a:r>
-          <a:endParaRPr lang="en-US" sz="1500" kern="1200" dirty="0"/>
-        </a:p>
-      </dsp:txBody>
-      <dsp:txXfrm>
-        <a:off x="0" y="309183"/>
-        <a:ext cx="8215370" cy="1346625"/>
-      </dsp:txXfrm>
-    </dsp:sp>
-    <dsp:sp modelId="{1889FF86-9751-4093-BBB8-3F4924CACDD1}">
-      <dsp:nvSpPr>
-        <dsp:cNvPr id="0" name=""/>
-        <dsp:cNvSpPr/>
-      </dsp:nvSpPr>
-      <dsp:spPr>
-        <a:xfrm>
-          <a:off x="410768" y="87783"/>
-          <a:ext cx="5750759" cy="442800"/>
-        </a:xfrm>
-        <a:prstGeom prst="roundRect">
-          <a:avLst/>
-        </a:prstGeom>
-        <a:gradFill rotWithShape="0">
-          <a:gsLst>
-            <a:gs pos="0">
-              <a:schemeClr val="accent2">
-                <a:hueOff val="0"/>
-                <a:satOff val="0"/>
-                <a:lumOff val="0"/>
-                <a:alphaOff val="0"/>
-                <a:shade val="51000"/>
-                <a:satMod val="130000"/>
-              </a:schemeClr>
-            </a:gs>
-            <a:gs pos="80000">
-              <a:schemeClr val="accent2">
-                <a:hueOff val="0"/>
-                <a:satOff val="0"/>
-                <a:lumOff val="0"/>
-                <a:alphaOff val="0"/>
-                <a:shade val="93000"/>
-                <a:satMod val="130000"/>
-              </a:schemeClr>
-            </a:gs>
-            <a:gs pos="100000">
-              <a:schemeClr val="accent2">
-                <a:hueOff val="0"/>
-                <a:satOff val="0"/>
-                <a:lumOff val="0"/>
-                <a:alphaOff val="0"/>
-                <a:shade val="94000"/>
-                <a:satMod val="135000"/>
-              </a:schemeClr>
-            </a:gs>
-          </a:gsLst>
-          <a:lin ang="16200000" scaled="0"/>
-        </a:gradFill>
-        <a:ln>
-          <a:noFill/>
-        </a:ln>
-        <a:effectLst>
-          <a:outerShdw blurRad="40000" dist="23000" dir="5400000" rotWithShape="0">
-            <a:srgbClr val="000000">
-              <a:alpha val="35000"/>
-            </a:srgbClr>
-          </a:outerShdw>
-        </a:effectLst>
-        <a:scene3d>
-          <a:camera prst="orthographicFront"/>
-          <a:lightRig rig="flat" dir="t"/>
-        </a:scene3d>
-        <a:sp3d prstMaterial="plastic">
-          <a:bevelT w="120900" h="88900"/>
-          <a:bevelB w="88900" h="31750" prst="angle"/>
-        </a:sp3d>
-      </dsp:spPr>
-      <dsp:style>
-        <a:lnRef idx="0">
-          <a:scrgbClr r="0" g="0" b="0"/>
-        </a:lnRef>
-        <a:fillRef idx="3">
-          <a:scrgbClr r="0" g="0" b="0"/>
-        </a:fillRef>
-        <a:effectRef idx="2">
-          <a:scrgbClr r="0" g="0" b="0"/>
-        </a:effectRef>
-        <a:fontRef idx="minor">
-          <a:schemeClr val="lt1"/>
-        </a:fontRef>
-      </dsp:style>
-      <dsp:txBody>
-        <a:bodyPr spcFirstLastPara="0" vert="horz" wrap="square" lIns="217365" tIns="0" rIns="217365" bIns="0" numCol="1" spcCol="1270" anchor="ctr" anchorCtr="0">
-          <a:noAutofit/>
-        </a:bodyPr>
-        <a:lstStyle/>
-        <a:p>
-          <a:pPr lvl="0" algn="l" defTabSz="666750">
-            <a:lnSpc>
-              <a:spcPct val="90000"/>
-            </a:lnSpc>
-            <a:spcBef>
-              <a:spcPct val="0"/>
-            </a:spcBef>
-            <a:spcAft>
-              <a:spcPct val="35000"/>
-            </a:spcAft>
-          </a:pPr>
-          <a:r>
-            <a:rPr lang="en-GB" sz="1500" kern="1200" dirty="0" smtClean="0"/>
-            <a:t>Domain-driven design</a:t>
-          </a:r>
-          <a:endParaRPr lang="en-GB" sz="1500" kern="1200" dirty="0"/>
-        </a:p>
-      </dsp:txBody>
-      <dsp:txXfrm>
-        <a:off x="432384" y="109399"/>
-        <a:ext cx="5707527" cy="399568"/>
-      </dsp:txXfrm>
-    </dsp:sp>
-    <dsp:sp modelId="{20F157B5-E271-446E-8E5B-B1E860AC53F7}">
-      <dsp:nvSpPr>
-        <dsp:cNvPr id="0" name=""/>
-        <dsp:cNvSpPr/>
-      </dsp:nvSpPr>
-      <dsp:spPr>
-        <a:xfrm>
-          <a:off x="0" y="1958209"/>
-          <a:ext cx="8215370" cy="850500"/>
-        </a:xfrm>
-        <a:prstGeom prst="rect">
-          <a:avLst/>
-        </a:prstGeom>
-        <a:solidFill>
-          <a:schemeClr val="lt1">
-            <a:alpha val="90000"/>
-            <a:hueOff val="0"/>
-            <a:satOff val="0"/>
-            <a:lumOff val="0"/>
-            <a:alphaOff val="0"/>
-          </a:schemeClr>
-        </a:solidFill>
-        <a:ln w="9525" cap="flat" cmpd="sng" algn="ctr">
-          <a:solidFill>
-            <a:schemeClr val="accent3">
-              <a:hueOff val="0"/>
-              <a:satOff val="0"/>
-              <a:lumOff val="0"/>
-              <a:alphaOff val="0"/>
-            </a:schemeClr>
-          </a:solidFill>
-          <a:prstDash val="solid"/>
-        </a:ln>
-        <a:effectLst>
-          <a:outerShdw blurRad="40000" dist="23000" dir="5400000" rotWithShape="0">
-            <a:srgbClr val="000000">
-              <a:alpha val="35000"/>
-            </a:srgbClr>
-          </a:outerShdw>
-        </a:effectLst>
-        <a:scene3d>
-          <a:camera prst="orthographicFront"/>
-          <a:lightRig rig="flat" dir="t"/>
-        </a:scene3d>
-        <a:sp3d z="190500" extrusionH="12700" prstMaterial="plastic">
-          <a:bevelT w="50800" h="50800"/>
-        </a:sp3d>
-      </dsp:spPr>
-      <dsp:style>
-        <a:lnRef idx="1">
-          <a:scrgbClr r="0" g="0" b="0"/>
-        </a:lnRef>
-        <a:fillRef idx="1">
-          <a:scrgbClr r="0" g="0" b="0"/>
-        </a:fillRef>
-        <a:effectRef idx="2">
-          <a:scrgbClr r="0" g="0" b="0"/>
-        </a:effectRef>
-        <a:fontRef idx="minor"/>
-      </dsp:style>
-      <dsp:txBody>
-        <a:bodyPr spcFirstLastPara="0" vert="horz" wrap="square" lIns="637604" tIns="312420" rIns="637604" bIns="106680" numCol="1" spcCol="1270" anchor="t" anchorCtr="0">
-          <a:noAutofit/>
-        </a:bodyPr>
-        <a:lstStyle/>
-        <a:p>
-          <a:pPr marL="114300" lvl="1" indent="-114300" algn="l" defTabSz="666750">
-            <a:lnSpc>
-              <a:spcPct val="90000"/>
-            </a:lnSpc>
-            <a:spcBef>
-              <a:spcPct val="0"/>
-            </a:spcBef>
-            <a:spcAft>
-              <a:spcPct val="15000"/>
-            </a:spcAft>
-            <a:buChar char="••"/>
-          </a:pPr>
-          <a:r>
-            <a:rPr lang="en-US" sz="1500" kern="1200" dirty="0" smtClean="0"/>
-            <a:t>Possibly the first large-scale application of agile development within the public sector, anywhere in the world</a:t>
-          </a:r>
-          <a:endParaRPr lang="en-GB" sz="1500" kern="1200" dirty="0"/>
-        </a:p>
-      </dsp:txBody>
-      <dsp:txXfrm>
-        <a:off x="0" y="1958209"/>
-        <a:ext cx="8215370" cy="850500"/>
-      </dsp:txXfrm>
-    </dsp:sp>
-    <dsp:sp modelId="{1AB0CF3B-353D-491D-93B3-DCD601C66E89}">
-      <dsp:nvSpPr>
-        <dsp:cNvPr id="0" name=""/>
-        <dsp:cNvSpPr/>
-      </dsp:nvSpPr>
-      <dsp:spPr>
-        <a:xfrm>
-          <a:off x="410768" y="1736809"/>
-          <a:ext cx="5750759" cy="442800"/>
-        </a:xfrm>
-        <a:prstGeom prst="roundRect">
-          <a:avLst/>
-        </a:prstGeom>
-        <a:gradFill rotWithShape="0">
-          <a:gsLst>
-            <a:gs pos="0">
-              <a:schemeClr val="accent3">
-                <a:hueOff val="0"/>
-                <a:satOff val="0"/>
-                <a:lumOff val="0"/>
-                <a:alphaOff val="0"/>
-                <a:shade val="51000"/>
-                <a:satMod val="130000"/>
-              </a:schemeClr>
-            </a:gs>
-            <a:gs pos="80000">
-              <a:schemeClr val="accent3">
-                <a:hueOff val="0"/>
-                <a:satOff val="0"/>
-                <a:lumOff val="0"/>
-                <a:alphaOff val="0"/>
-                <a:shade val="93000"/>
-                <a:satMod val="130000"/>
-              </a:schemeClr>
-            </a:gs>
-            <a:gs pos="100000">
-              <a:schemeClr val="accent3">
-                <a:hueOff val="0"/>
-                <a:satOff val="0"/>
-                <a:lumOff val="0"/>
-                <a:alphaOff val="0"/>
-                <a:shade val="94000"/>
-                <a:satMod val="135000"/>
-              </a:schemeClr>
-            </a:gs>
-          </a:gsLst>
-          <a:lin ang="16200000" scaled="0"/>
-        </a:gradFill>
-        <a:ln>
-          <a:noFill/>
-        </a:ln>
-        <a:effectLst>
-          <a:outerShdw blurRad="40000" dist="23000" dir="5400000" rotWithShape="0">
-            <a:srgbClr val="000000">
-              <a:alpha val="35000"/>
-            </a:srgbClr>
-          </a:outerShdw>
-        </a:effectLst>
-        <a:scene3d>
-          <a:camera prst="orthographicFront"/>
-          <a:lightRig rig="flat" dir="t"/>
-        </a:scene3d>
-        <a:sp3d prstMaterial="plastic">
-          <a:bevelT w="120900" h="88900"/>
-          <a:bevelB w="88900" h="31750" prst="angle"/>
-        </a:sp3d>
-      </dsp:spPr>
-      <dsp:style>
-        <a:lnRef idx="0">
-          <a:scrgbClr r="0" g="0" b="0"/>
-        </a:lnRef>
-        <a:fillRef idx="3">
-          <a:scrgbClr r="0" g="0" b="0"/>
-        </a:fillRef>
-        <a:effectRef idx="2">
-          <a:scrgbClr r="0" g="0" b="0"/>
-        </a:effectRef>
-        <a:fontRef idx="minor">
-          <a:schemeClr val="lt1"/>
-        </a:fontRef>
-      </dsp:style>
-      <dsp:txBody>
-        <a:bodyPr spcFirstLastPara="0" vert="horz" wrap="square" lIns="217365" tIns="0" rIns="217365" bIns="0" numCol="1" spcCol="1270" anchor="ctr" anchorCtr="0">
-          <a:noAutofit/>
-        </a:bodyPr>
-        <a:lstStyle/>
-        <a:p>
-          <a:pPr lvl="0" algn="l" defTabSz="666750">
-            <a:lnSpc>
-              <a:spcPct val="90000"/>
-            </a:lnSpc>
-            <a:spcBef>
-              <a:spcPct val="0"/>
-            </a:spcBef>
-            <a:spcAft>
-              <a:spcPct val="35000"/>
-            </a:spcAft>
-          </a:pPr>
-          <a:r>
-            <a:rPr lang="en-GB" sz="1500" kern="1200" dirty="0" smtClean="0"/>
-            <a:t>Agile Development</a:t>
-          </a:r>
-          <a:endParaRPr lang="en-GB" sz="1500" kern="1200" dirty="0"/>
-        </a:p>
-      </dsp:txBody>
-      <dsp:txXfrm>
-        <a:off x="432384" y="1758425"/>
-        <a:ext cx="5707527" cy="399568"/>
-      </dsp:txXfrm>
-    </dsp:sp>
-    <dsp:sp modelId="{528C29A9-283C-40E8-AFF6-B7739F2DA789}">
-      <dsp:nvSpPr>
-        <dsp:cNvPr id="0" name=""/>
-        <dsp:cNvSpPr/>
-      </dsp:nvSpPr>
-      <dsp:spPr>
-        <a:xfrm>
-          <a:off x="0" y="3111109"/>
-          <a:ext cx="8215370" cy="637875"/>
-        </a:xfrm>
-        <a:prstGeom prst="rect">
-          <a:avLst/>
-        </a:prstGeom>
-        <a:solidFill>
-          <a:schemeClr val="lt1">
-            <a:alpha val="90000"/>
-            <a:hueOff val="0"/>
-            <a:satOff val="0"/>
-            <a:lumOff val="0"/>
-            <a:alphaOff val="0"/>
-          </a:schemeClr>
-        </a:solidFill>
-        <a:ln w="9525" cap="flat" cmpd="sng" algn="ctr">
-          <a:solidFill>
-            <a:schemeClr val="accent4">
-              <a:hueOff val="0"/>
-              <a:satOff val="0"/>
-              <a:lumOff val="0"/>
-              <a:alphaOff val="0"/>
-            </a:schemeClr>
-          </a:solidFill>
-          <a:prstDash val="solid"/>
-        </a:ln>
-        <a:effectLst>
-          <a:outerShdw blurRad="40000" dist="23000" dir="5400000" rotWithShape="0">
-            <a:srgbClr val="000000">
-              <a:alpha val="35000"/>
-            </a:srgbClr>
-          </a:outerShdw>
-        </a:effectLst>
-        <a:scene3d>
-          <a:camera prst="orthographicFront"/>
-          <a:lightRig rig="flat" dir="t"/>
-        </a:scene3d>
-        <a:sp3d z="190500" extrusionH="12700" prstMaterial="plastic">
-          <a:bevelT w="50800" h="50800"/>
-        </a:sp3d>
-      </dsp:spPr>
-      <dsp:style>
-        <a:lnRef idx="1">
-          <a:scrgbClr r="0" g="0" b="0"/>
-        </a:lnRef>
-        <a:fillRef idx="1">
-          <a:scrgbClr r="0" g="0" b="0"/>
-        </a:fillRef>
-        <a:effectRef idx="2">
-          <a:scrgbClr r="0" g="0" b="0"/>
-        </a:effectRef>
-        <a:fontRef idx="minor"/>
-      </dsp:style>
-      <dsp:txBody>
-        <a:bodyPr spcFirstLastPara="0" vert="horz" wrap="square" lIns="637604" tIns="312420" rIns="637604" bIns="106680" numCol="1" spcCol="1270" anchor="t" anchorCtr="0">
-          <a:noAutofit/>
-        </a:bodyPr>
-        <a:lstStyle/>
-        <a:p>
-          <a:pPr marL="114300" lvl="1" indent="-114300" algn="l" defTabSz="666750">
-            <a:lnSpc>
-              <a:spcPct val="90000"/>
-            </a:lnSpc>
-            <a:spcBef>
-              <a:spcPct val="0"/>
-            </a:spcBef>
-            <a:spcAft>
-              <a:spcPct val="15000"/>
-            </a:spcAft>
-            <a:buChar char="••"/>
-          </a:pPr>
-          <a:r>
-            <a:rPr lang="en-US" sz="1500" kern="1200" dirty="0" smtClean="0"/>
-            <a:t>A rich user interface to a core transactional business system</a:t>
-          </a:r>
-          <a:endParaRPr lang="en-GB" sz="1500" kern="1200" dirty="0"/>
-        </a:p>
-      </dsp:txBody>
-      <dsp:txXfrm>
-        <a:off x="0" y="3111109"/>
-        <a:ext cx="8215370" cy="637875"/>
-      </dsp:txXfrm>
-    </dsp:sp>
-    <dsp:sp modelId="{A729A4AA-1975-479E-8A2C-6D34C13E758E}">
-      <dsp:nvSpPr>
-        <dsp:cNvPr id="0" name=""/>
-        <dsp:cNvSpPr/>
-      </dsp:nvSpPr>
-      <dsp:spPr>
-        <a:xfrm>
-          <a:off x="410768" y="2889709"/>
-          <a:ext cx="5750759" cy="442800"/>
-        </a:xfrm>
-        <a:prstGeom prst="roundRect">
-          <a:avLst/>
-        </a:prstGeom>
-        <a:gradFill rotWithShape="0">
-          <a:gsLst>
-            <a:gs pos="0">
-              <a:schemeClr val="accent4">
-                <a:hueOff val="0"/>
-                <a:satOff val="0"/>
-                <a:lumOff val="0"/>
-                <a:alphaOff val="0"/>
-                <a:shade val="51000"/>
-                <a:satMod val="130000"/>
-              </a:schemeClr>
-            </a:gs>
-            <a:gs pos="80000">
-              <a:schemeClr val="accent4">
-                <a:hueOff val="0"/>
-                <a:satOff val="0"/>
-                <a:lumOff val="0"/>
-                <a:alphaOff val="0"/>
-                <a:shade val="93000"/>
-                <a:satMod val="130000"/>
-              </a:schemeClr>
-            </a:gs>
-            <a:gs pos="100000">
-              <a:schemeClr val="accent4">
-                <a:hueOff val="0"/>
-                <a:satOff val="0"/>
-                <a:lumOff val="0"/>
-                <a:alphaOff val="0"/>
-                <a:shade val="94000"/>
-                <a:satMod val="135000"/>
-              </a:schemeClr>
-            </a:gs>
-          </a:gsLst>
-          <a:lin ang="16200000" scaled="0"/>
-        </a:gradFill>
-        <a:ln>
-          <a:noFill/>
-        </a:ln>
-        <a:effectLst>
-          <a:outerShdw blurRad="40000" dist="23000" dir="5400000" rotWithShape="0">
-            <a:srgbClr val="000000">
-              <a:alpha val="35000"/>
-            </a:srgbClr>
-          </a:outerShdw>
-        </a:effectLst>
-        <a:scene3d>
-          <a:camera prst="orthographicFront"/>
-          <a:lightRig rig="flat" dir="t"/>
-        </a:scene3d>
-        <a:sp3d prstMaterial="plastic">
-          <a:bevelT w="120900" h="88900"/>
-          <a:bevelB w="88900" h="31750" prst="angle"/>
-        </a:sp3d>
-      </dsp:spPr>
-      <dsp:style>
-        <a:lnRef idx="0">
-          <a:scrgbClr r="0" g="0" b="0"/>
-        </a:lnRef>
-        <a:fillRef idx="3">
-          <a:scrgbClr r="0" g="0" b="0"/>
-        </a:fillRef>
-        <a:effectRef idx="2">
-          <a:scrgbClr r="0" g="0" b="0"/>
-        </a:effectRef>
-        <a:fontRef idx="minor">
-          <a:schemeClr val="lt1"/>
-        </a:fontRef>
-      </dsp:style>
-      <dsp:txBody>
-        <a:bodyPr spcFirstLastPara="0" vert="horz" wrap="square" lIns="217365" tIns="0" rIns="217365" bIns="0" numCol="1" spcCol="1270" anchor="ctr" anchorCtr="0">
-          <a:noAutofit/>
-        </a:bodyPr>
-        <a:lstStyle/>
-        <a:p>
-          <a:pPr lvl="0" algn="l" defTabSz="666750">
-            <a:lnSpc>
-              <a:spcPct val="90000"/>
-            </a:lnSpc>
-            <a:spcBef>
-              <a:spcPct val="0"/>
-            </a:spcBef>
-            <a:spcAft>
-              <a:spcPct val="35000"/>
-            </a:spcAft>
-          </a:pPr>
-          <a:r>
-            <a:rPr lang="en-GB" sz="1500" kern="1200" dirty="0" smtClean="0"/>
-            <a:t>Empowered Users</a:t>
-          </a:r>
-          <a:endParaRPr lang="en-GB" sz="1500" kern="1200" dirty="0"/>
-        </a:p>
-      </dsp:txBody>
-      <dsp:txXfrm>
-        <a:off x="432384" y="2911325"/>
-        <a:ext cx="5707527" cy="399568"/>
-      </dsp:txXfrm>
-    </dsp:sp>
-    <dsp:sp modelId="{801468B0-FD5A-4080-9512-224DEA6DDD3B}">
-      <dsp:nvSpPr>
-        <dsp:cNvPr id="0" name=""/>
-        <dsp:cNvSpPr/>
-      </dsp:nvSpPr>
-      <dsp:spPr>
-        <a:xfrm>
-          <a:off x="0" y="4051384"/>
-          <a:ext cx="8215370" cy="1134000"/>
-        </a:xfrm>
-        <a:prstGeom prst="rect">
-          <a:avLst/>
-        </a:prstGeom>
-        <a:solidFill>
-          <a:schemeClr val="lt1">
-            <a:alpha val="90000"/>
-            <a:hueOff val="0"/>
-            <a:satOff val="0"/>
-            <a:lumOff val="0"/>
-            <a:alphaOff val="0"/>
-          </a:schemeClr>
-        </a:solidFill>
-        <a:ln w="9525" cap="flat" cmpd="sng" algn="ctr">
-          <a:solidFill>
-            <a:schemeClr val="accent5">
-              <a:hueOff val="0"/>
-              <a:satOff val="0"/>
-              <a:lumOff val="0"/>
-              <a:alphaOff val="0"/>
-            </a:schemeClr>
-          </a:solidFill>
-          <a:prstDash val="solid"/>
-        </a:ln>
-        <a:effectLst>
-          <a:outerShdw blurRad="40000" dist="23000" dir="5400000" rotWithShape="0">
-            <a:srgbClr val="000000">
-              <a:alpha val="35000"/>
-            </a:srgbClr>
-          </a:outerShdw>
-        </a:effectLst>
-        <a:scene3d>
-          <a:camera prst="orthographicFront"/>
-          <a:lightRig rig="flat" dir="t"/>
-        </a:scene3d>
-        <a:sp3d z="190500" extrusionH="12700" prstMaterial="plastic">
-          <a:bevelT w="50800" h="50800"/>
-        </a:sp3d>
-      </dsp:spPr>
-      <dsp:style>
-        <a:lnRef idx="1">
-          <a:scrgbClr r="0" g="0" b="0"/>
-        </a:lnRef>
-        <a:fillRef idx="1">
-          <a:scrgbClr r="0" g="0" b="0"/>
-        </a:fillRef>
-        <a:effectRef idx="2">
-          <a:scrgbClr r="0" g="0" b="0"/>
-        </a:effectRef>
-        <a:fontRef idx="minor"/>
-      </dsp:style>
-      <dsp:txBody>
-        <a:bodyPr spcFirstLastPara="0" vert="horz" wrap="square" lIns="637604" tIns="312420" rIns="637604" bIns="106680" numCol="1" spcCol="1270" anchor="t" anchorCtr="0">
-          <a:noAutofit/>
-        </a:bodyPr>
-        <a:lstStyle/>
-        <a:p>
-          <a:pPr marL="114300" lvl="1" indent="-114300" algn="l" defTabSz="666750">
-            <a:lnSpc>
-              <a:spcPct val="90000"/>
-            </a:lnSpc>
-            <a:spcBef>
-              <a:spcPct val="0"/>
-            </a:spcBef>
-            <a:spcAft>
-              <a:spcPct val="15000"/>
-            </a:spcAft>
-            <a:buChar char="••"/>
-          </a:pPr>
-          <a:r>
-            <a:rPr lang="en-US" sz="1500" kern="1200" dirty="0" smtClean="0"/>
-            <a:t>User interfaces 100% auto-generated from the underlying business objects</a:t>
-          </a:r>
-          <a:endParaRPr lang="en-GB" sz="1500" kern="1200" dirty="0"/>
-        </a:p>
-        <a:p>
-          <a:pPr marL="228600" lvl="2" indent="-114300" algn="l" defTabSz="666750">
-            <a:lnSpc>
-              <a:spcPct val="90000"/>
-            </a:lnSpc>
-            <a:spcBef>
-              <a:spcPct val="0"/>
-            </a:spcBef>
-            <a:spcAft>
-              <a:spcPct val="15000"/>
-            </a:spcAft>
-            <a:buChar char="••"/>
-          </a:pPr>
-          <a:r>
-            <a:rPr lang="en-US" sz="1500" kern="1200" dirty="0" smtClean="0"/>
-            <a:t>with no custom coding to write or to maintain</a:t>
-          </a:r>
-          <a:endParaRPr lang="en-US" sz="1500" kern="1200" dirty="0"/>
-        </a:p>
-        <a:p>
-          <a:pPr marL="114300" lvl="1" indent="-114300" algn="l" defTabSz="666750">
-            <a:lnSpc>
-              <a:spcPct val="90000"/>
-            </a:lnSpc>
-            <a:spcBef>
-              <a:spcPct val="0"/>
-            </a:spcBef>
-            <a:spcAft>
-              <a:spcPct val="15000"/>
-            </a:spcAft>
-            <a:buChar char="••"/>
-          </a:pPr>
-          <a:r>
-            <a:rPr lang="en-US" sz="1500" kern="1200" dirty="0" smtClean="0"/>
-            <a:t>More opportunity to explore domain than otherwise possible</a:t>
-          </a:r>
-          <a:endParaRPr lang="en-US" sz="1500" kern="1200" dirty="0"/>
-        </a:p>
-      </dsp:txBody>
-      <dsp:txXfrm>
-        <a:off x="0" y="4051384"/>
-        <a:ext cx="8215370" cy="1134000"/>
-      </dsp:txXfrm>
-    </dsp:sp>
-    <dsp:sp modelId="{08BC86D2-E558-474B-B1C4-E4B2BCE4CD01}">
-      <dsp:nvSpPr>
-        <dsp:cNvPr id="0" name=""/>
-        <dsp:cNvSpPr/>
-      </dsp:nvSpPr>
-      <dsp:spPr>
-        <a:xfrm>
-          <a:off x="410768" y="3829984"/>
-          <a:ext cx="5750759" cy="442800"/>
-        </a:xfrm>
-        <a:prstGeom prst="roundRect">
-          <a:avLst/>
-        </a:prstGeom>
-        <a:gradFill rotWithShape="0">
-          <a:gsLst>
-            <a:gs pos="0">
-              <a:schemeClr val="accent5">
-                <a:hueOff val="0"/>
-                <a:satOff val="0"/>
-                <a:lumOff val="0"/>
-                <a:alphaOff val="0"/>
-                <a:shade val="51000"/>
-                <a:satMod val="130000"/>
-              </a:schemeClr>
-            </a:gs>
-            <a:gs pos="80000">
-              <a:schemeClr val="accent5">
-                <a:hueOff val="0"/>
-                <a:satOff val="0"/>
-                <a:lumOff val="0"/>
-                <a:alphaOff val="0"/>
-                <a:shade val="93000"/>
-                <a:satMod val="130000"/>
-              </a:schemeClr>
-            </a:gs>
-            <a:gs pos="100000">
-              <a:schemeClr val="accent5">
-                <a:hueOff val="0"/>
-                <a:satOff val="0"/>
-                <a:lumOff val="0"/>
-                <a:alphaOff val="0"/>
-                <a:shade val="94000"/>
-                <a:satMod val="135000"/>
-              </a:schemeClr>
-            </a:gs>
-          </a:gsLst>
-          <a:lin ang="16200000" scaled="0"/>
-        </a:gradFill>
-        <a:ln>
-          <a:noFill/>
-        </a:ln>
-        <a:effectLst>
-          <a:outerShdw blurRad="40000" dist="23000" dir="5400000" rotWithShape="0">
-            <a:srgbClr val="000000">
-              <a:alpha val="35000"/>
-            </a:srgbClr>
-          </a:outerShdw>
-        </a:effectLst>
-        <a:scene3d>
-          <a:camera prst="orthographicFront"/>
-          <a:lightRig rig="flat" dir="t"/>
-        </a:scene3d>
-        <a:sp3d prstMaterial="plastic">
-          <a:bevelT w="120900" h="88900"/>
-          <a:bevelB w="88900" h="31750" prst="angle"/>
-        </a:sp3d>
-      </dsp:spPr>
-      <dsp:style>
-        <a:lnRef idx="0">
-          <a:scrgbClr r="0" g="0" b="0"/>
-        </a:lnRef>
-        <a:fillRef idx="3">
-          <a:scrgbClr r="0" g="0" b="0"/>
-        </a:fillRef>
-        <a:effectRef idx="2">
-          <a:scrgbClr r="0" g="0" b="0"/>
-        </a:effectRef>
-        <a:fontRef idx="minor">
-          <a:schemeClr val="lt1"/>
-        </a:fontRef>
-      </dsp:style>
-      <dsp:txBody>
-        <a:bodyPr spcFirstLastPara="0" vert="horz" wrap="square" lIns="217365" tIns="0" rIns="217365" bIns="0" numCol="1" spcCol="1270" anchor="ctr" anchorCtr="0">
-          <a:noAutofit/>
-        </a:bodyPr>
-        <a:lstStyle/>
-        <a:p>
-          <a:pPr lvl="0" algn="l" defTabSz="666750">
-            <a:lnSpc>
-              <a:spcPct val="90000"/>
-            </a:lnSpc>
-            <a:spcBef>
-              <a:spcPct val="0"/>
-            </a:spcBef>
-            <a:spcAft>
-              <a:spcPct val="35000"/>
-            </a:spcAft>
-          </a:pPr>
-          <a:r>
-            <a:rPr lang="en-US" sz="1500" kern="1200" dirty="0" smtClean="0"/>
-            <a:t>Powerful &amp; Productive Environment</a:t>
-          </a:r>
-          <a:endParaRPr lang="en-US" sz="1500" kern="1200" dirty="0"/>
-        </a:p>
-      </dsp:txBody>
-      <dsp:txXfrm>
-        <a:off x="432384" y="3851600"/>
-        <a:ext cx="5707527" cy="399568"/>
-      </dsp:txXfrm>
-    </dsp:sp>
   </dsp:spTree>
 </dsp:drawing>
 </file>
@@ -14225,7 +13349,7 @@
           <a:p>
             <a:fld id="{D57AE76F-E67D-4E52-B4AA-F889744E4B89}" type="datetimeFigureOut">
               <a:rPr lang="en-GB" smtClean="0"/>
-              <a:t>07/02/2011</a:t>
+              <a:t>06/03/2011</a:t>
             </a:fld>
             <a:endParaRPr lang="en-GB"/>
           </a:p>
@@ -14395,7 +13519,7 @@
           <a:p>
             <a:fld id="{FC993C7B-7F8B-4B8A-9D83-E8C0718AE1FC}" type="datetimeFigureOut">
               <a:rPr lang="en-GB" smtClean="0"/>
-              <a:t>07/02/2011</a:t>
+              <a:t>06/03/2011</a:t>
             </a:fld>
             <a:endParaRPr lang="en-GB"/>
           </a:p>
@@ -14851,11 +13975,7 @@
           <a:p>
             <a:r>
               <a:rPr lang="en-US" dirty="0" smtClean="0"/>
-              <a:t>DSP is the Irish Government’s Department of Social Protection, responsible for the payment of social welfare payments, such as pensions and child benefit.  These are two of the largest benefits, but in all the department administers ~45 benefits.  Of these, currently around 12 of these (including pensions and CB) are administered by a </a:t>
-            </a:r>
-            <a:r>
-              <a:rPr lang="en-US" dirty="0" smtClean="0"/>
-              <a:t>naked </a:t>
+              <a:t>DSP is the Irish Government’s Department of Social Protection, responsible for the payment of social welfare payments, such as pensions and child benefit.  These are two of the largest benefits, but in all the department administers ~45 benefits.  Of these, currently around 12 of these (including pensions and CB) are administered by a naked </a:t>
             </a:r>
             <a:r>
               <a:rPr lang="en-US" dirty="0"/>
@@ -14863,11 +13983,7 @@
             </a:r>
             <a:r>
               <a:rPr lang="en-US" dirty="0" smtClean="0"/>
-              <a:t>bjects system (running on .NET). </a:t>
-            </a:r>
-            <a:r>
-              <a:rPr lang="en-US" dirty="0" smtClean="0"/>
-              <a:t>As such, the system is a </a:t>
+              <a:t>bjects system (running on .NET). As such, the system is a </a:t>
             </a:r>
             <a:r>
               <a:rPr lang="en-GB" dirty="0" smtClean="0"/>
@@ -14880,11 +13996,7 @@
           <a:p>
             <a:r>
               <a:rPr lang="en-US" dirty="0" smtClean="0"/>
-              <a:t>This slide talks about why the DSP chose  a </a:t>
-            </a:r>
-            <a:r>
-              <a:rPr lang="en-US" dirty="0" smtClean="0"/>
-              <a:t>naked </a:t>
+              <a:t>This slide talks about why the DSP chose  a naked </a:t>
             </a:r>
             <a:r>
               <a:rPr lang="en-US" dirty="0"/>
@@ -14892,17 +14004,8 @@
             </a:r>
             <a:r>
               <a:rPr lang="en-US" dirty="0" smtClean="0"/>
-              <a:t>bjects </a:t>
-            </a:r>
-            <a:r>
-              <a:rPr lang="en-US" dirty="0" smtClean="0"/>
-              <a:t>system in the first place, couching the answer in terms of letting the department become more agile.  The system has indeed demonstrated agility on all three </a:t>
-            </a:r>
-            <a:r>
-              <a:rPr lang="en-US" dirty="0" smtClean="0"/>
-              <a:t>levels; for example:</a:t>
-            </a:r>
-            <a:endParaRPr lang="en-US" dirty="0" smtClean="0"/>
+              <a:t>bjects system in the first place, couching the answer in terms of letting the department become more agile.  The system has indeed demonstrated agility on all three levels; for example:</a:t>
+            </a:r>
           </a:p>
           <a:p>
             <a:pPr marL="185715" indent="-185715">
@@ -15060,11 +14163,7 @@
           <a:p>
             <a:r>
               <a:rPr lang="en-US" dirty="0" smtClean="0"/>
-              <a:t>As mentioned on the previous slide, the DSP administers ~45 schemes, of which ~12 now run </a:t>
-            </a:r>
-            <a:r>
-              <a:rPr lang="en-US" dirty="0" smtClean="0"/>
-              <a:t>on naked </a:t>
+              <a:t>As mentioned on the previous slide, the DSP administers ~45 schemes, of which ~12 now run on naked </a:t>
             </a:r>
             <a:r>
               <a:rPr lang="en-US" dirty="0"/>
@@ -15072,15 +14171,7 @@
             </a:r>
             <a:r>
               <a:rPr lang="en-US" dirty="0" smtClean="0"/>
-              <a:t>bjects </a:t>
-            </a:r>
-            <a:r>
-              <a:rPr lang="en-US" dirty="0" smtClean="0"/>
-              <a:t>system.  The long-term plan is to support all systems via </a:t>
-            </a:r>
-            <a:r>
-              <a:rPr lang="en-US" dirty="0" smtClean="0"/>
-              <a:t>naked </a:t>
+              <a:t>bjects system.  The long-term plan is to support all systems via naked </a:t>
             </a:r>
             <a:r>
               <a:rPr lang="en-US" dirty="0"/>
@@ -15088,11 +14179,7 @@
             </a:r>
             <a:r>
               <a:rPr lang="en-US" dirty="0" smtClean="0"/>
-              <a:t>bjects </a:t>
-            </a:r>
-            <a:r>
-              <a:rPr lang="en-US" dirty="0" smtClean="0"/>
-              <a:t>(in some cases wrapping legacy systems, in others porting the functionality over).</a:t>
+              <a:t>bjects (in some cases wrapping legacy systems, in others porting the functionality over).</a:t>
             </a:r>
           </a:p>
           <a:p>
@@ -15175,15 +14262,7 @@
             </a:pPr>
             <a:r>
               <a:rPr lang="en-US" dirty="0" smtClean="0"/>
-              <a:t>domain services that </a:t>
-            </a:r>
-            <a:r>
-              <a:rPr lang="en-US" dirty="0" smtClean="0"/>
-              <a:t>integrate </a:t>
-            </a:r>
-            <a:r>
-              <a:rPr lang="en-US" dirty="0" smtClean="0"/>
-              <a:t>with other systems, technologies and departments</a:t>
+              <a:t>domain services that integrate with other systems, technologies and departments</a:t>
             </a:r>
           </a:p>
           <a:p>
@@ -15367,11 +14446,7 @@
             </a:pPr>
             <a:r>
               <a:rPr lang="en-GB" dirty="0" smtClean="0"/>
-              <a:t>monthly </a:t>
-            </a:r>
-            <a:r>
-              <a:rPr lang="en-GB" dirty="0" smtClean="0"/>
-              <a:t>releases and planning games</a:t>
+              <a:t>monthly releases and planning games</a:t>
             </a:r>
             <a:endParaRPr lang="en-GB" dirty="0"/>
           </a:p>
@@ -15908,27 +14983,7 @@
             <a:pPr eaLnBrk="1" hangingPunct="1"/>
             <a:r>
               <a:rPr lang="en-US" dirty="0" smtClean="0"/>
-              <a:t>It’s worth contrasting this with other tools that can generate CRUD applications.  First, the UI is generated at runtime, not compile-time (there’s no “generate scaffolding” command to run).  Second, exposing object actions means this is more than just simple CRUD style applications.  Third, with Apache Isis we always starts with </a:t>
-            </a:r>
-            <a:r>
-              <a:rPr lang="en-US" dirty="0" smtClean="0"/>
-              <a:t>the domain layer.  Some o</a:t>
-            </a:r>
-            <a:r>
-              <a:rPr lang="en-US" dirty="0" smtClean="0"/>
-              <a:t>ther tools start </a:t>
-            </a:r>
-            <a:r>
-              <a:rPr lang="en-US" dirty="0" smtClean="0"/>
-              <a:t>with either a </a:t>
-            </a:r>
-            <a:r>
-              <a:rPr lang="en-US" dirty="0" smtClean="0"/>
-              <a:t>database schema </a:t>
-            </a:r>
-            <a:r>
-              <a:rPr lang="en-US" dirty="0" smtClean="0"/>
-              <a:t>(</a:t>
+              <a:t>It’s worth contrasting this with other tools that can generate CRUD applications.  First, the UI is generated at runtime, not compile-time (there’s no “generate scaffolding” command to run).  Second, exposing object actions means this is more than just simple CRUD style applications.  Third, with Apache Isis we always starts with the domain layer.  Some other tools start with either a database schema (</a:t>
             </a:r>
             <a:r>
               <a:rPr lang="en-US" dirty="0" err="1" smtClean="0"/>
@@ -15936,35 +14991,7 @@
             </a:r>
             <a:r>
               <a:rPr lang="en-US" dirty="0" smtClean="0"/>
-              <a:t> reverse engineering </a:t>
-            </a:r>
-            <a:r>
-              <a:rPr lang="en-US" dirty="0" smtClean="0"/>
-              <a:t>a </a:t>
-            </a:r>
-            <a:r>
-              <a:rPr lang="en-US" dirty="0" smtClean="0"/>
-              <a:t>data </a:t>
-            </a:r>
-            <a:r>
-              <a:rPr lang="en-US" dirty="0" smtClean="0"/>
-              <a:t>model</a:t>
-            </a:r>
-            <a:r>
-              <a:rPr lang="en-US" dirty="0" smtClean="0"/>
-              <a:t>), </a:t>
-            </a:r>
-            <a:r>
-              <a:rPr lang="en-US" dirty="0" smtClean="0"/>
-              <a:t>or start with the </a:t>
-            </a:r>
-            <a:r>
-              <a:rPr lang="en-US" dirty="0" smtClean="0"/>
-              <a:t>presentation layer </a:t>
-            </a:r>
-            <a:r>
-              <a:rPr lang="en-US" dirty="0" smtClean="0"/>
-              <a:t>(where the domain model can end up as a 2</a:t>
+              <a:t> reverse engineering a data model), or start with the presentation layer (where the domain model can end up as a 2</a:t>
             </a:r>
             <a:r>
               <a:rPr lang="en-US" baseline="30000" dirty="0" smtClean="0"/>
@@ -15974,7 +15001,6 @@
               <a:rPr lang="en-US" dirty="0" smtClean="0"/>
               <a:t> class citizen as the domain expert gets distracted by UI concerns).</a:t>
             </a:r>
-            <a:endParaRPr lang="en-US" dirty="0" smtClean="0"/>
           </a:p>
           <a:p>
             <a:pPr eaLnBrk="1" hangingPunct="1"/>
@@ -16093,15 +15119,7 @@
             </a:r>
             <a:r>
               <a:rPr lang="en-US" dirty="0" smtClean="0"/>
-              <a:t>Alistair Cockburn’s blog for his original description). From a build perspective, Isis is built using Maven, so each of the boxes shown constitutes </a:t>
-            </a:r>
-            <a:r>
-              <a:rPr lang="en-US" dirty="0" smtClean="0"/>
-              <a:t>either one or several </a:t>
-            </a:r>
-            <a:r>
-              <a:rPr lang="en-US" dirty="0" smtClean="0"/>
-              <a:t>Maven modules.</a:t>
+              <a:t>Alistair Cockburn’s blog for his original description). From a build perspective, Isis is built using Maven, so each of the boxes shown constitutes either one or several Maven modules.</a:t>
             </a:r>
             <a:endParaRPr lang="en-US" dirty="0"/>
           </a:p>
@@ -16293,15 +15311,7 @@
             </a:r>
             <a:r>
               <a:rPr lang="en-US" baseline="0" dirty="0" smtClean="0"/>
-              <a:t>aving a ubiquitous language is all well and good, but if </a:t>
-            </a:r>
-            <a:r>
-              <a:rPr lang="en-US" baseline="0" dirty="0" smtClean="0"/>
-              <a:t>there’s no </a:t>
-            </a:r>
-            <a:r>
-              <a:rPr lang="en-US" baseline="0" dirty="0" smtClean="0"/>
-              <a:t>representation of it in the code, then that’s a problem.</a:t>
+              <a:t>aving a ubiquitous language is all well and good, but if there’s no representation of it in the code, then that’s a problem.</a:t>
             </a:r>
           </a:p>
           <a:p>
@@ -16382,29 +15392,8 @@
             </a:r>
             <a:r>
               <a:rPr lang="en-US" dirty="0" smtClean="0"/>
-              <a:t> tend to recommend that every time you identify a domain concept, add it in some form to the codebase.  It may be an entity, an interface or a value, and may start out with very few or even no responsibilities.  However, once it exists, it will </a:t>
-            </a:r>
-            <a:r>
-              <a:rPr lang="en-US" dirty="0" smtClean="0"/>
-              <a:t>become part of the team’s language and over time will </a:t>
-            </a:r>
-            <a:r>
-              <a:rPr lang="en-US" dirty="0" smtClean="0"/>
-              <a:t>inevitably </a:t>
-            </a:r>
-            <a:r>
-              <a:rPr lang="en-US" dirty="0" smtClean="0"/>
-              <a:t>acquire </a:t>
-            </a:r>
-            <a:r>
-              <a:rPr lang="en-US" dirty="0" smtClean="0"/>
-              <a:t>its own set of </a:t>
-            </a:r>
-            <a:r>
-              <a:rPr lang="en-US" dirty="0" smtClean="0"/>
-              <a:t>responsibilities.</a:t>
-            </a:r>
-            <a:endParaRPr lang="en-US" dirty="0" smtClean="0"/>
+              <a:t> tend to recommend that every time you identify a domain concept, add it in some form to the codebase.  It may be an entity, an interface or a value, and may start out with very few or even no responsibilities.  However, once it exists, it will become part of the team’s language and over time will inevitably acquire its own set of responsibilities.</a:t>
+            </a:r>
           </a:p>
           <a:p>
             <a:pPr defTabSz="990478">
@@ -16415,11 +15404,7 @@
           <a:p>
             <a:r>
               <a:rPr lang="en-US" dirty="0" smtClean="0"/>
-              <a:t>Adopting this </a:t>
-            </a:r>
-            <a:r>
-              <a:rPr lang="en-US" dirty="0" smtClean="0"/>
-              <a:t>approach also removes the artificial barrier that can arise between </a:t>
+              <a:t>Adopting this approach also removes the artificial barrier that can arise between </a:t>
             </a:r>
             <a:r>
               <a:rPr lang="en-US" dirty="0"/>
@@ -16427,15 +15412,7 @@
             </a:r>
             <a:r>
               <a:rPr lang="en-US" dirty="0" smtClean="0"/>
-              <a:t>and </a:t>
-            </a:r>
-            <a:r>
-              <a:rPr lang="en-US" dirty="0" smtClean="0"/>
-              <a:t>design, of maintaining an analysis model and a design model.  Instead, analysis should be about </a:t>
-            </a:r>
-            <a:r>
-              <a:rPr lang="en-US" dirty="0" smtClean="0"/>
-              <a:t>being able to zoom in on (or filter out) details from the (one-and-only) domain model. </a:t>
+              <a:t>and design, of maintaining an analysis model and a design model.  Instead, analysis should be about being able to zoom in on (or filter out) details from the (one-and-only) domain model. </a:t>
             </a:r>
             <a:r>
               <a:rPr lang="en-GB" dirty="0" smtClean="0"/>
@@ -16455,43 +15432,7 @@
             </a:r>
             <a:r>
               <a:rPr lang="en-GB" dirty="0" smtClean="0"/>
-              <a:t>made to bridge analysis and design, because the </a:t>
-            </a:r>
-            <a:r>
-              <a:rPr lang="en-GB" dirty="0" smtClean="0"/>
-              <a:t>majority </a:t>
-            </a:r>
-            <a:r>
-              <a:rPr lang="en-GB" dirty="0" smtClean="0"/>
-              <a:t>of coding effort put in by the team </a:t>
-            </a:r>
-            <a:r>
-              <a:rPr lang="en-GB" dirty="0" smtClean="0"/>
-              <a:t>is </a:t>
-            </a:r>
-            <a:r>
-              <a:rPr lang="en-GB" dirty="0" smtClean="0"/>
-              <a:t>on </a:t>
-            </a:r>
-            <a:r>
-              <a:rPr lang="en-GB" dirty="0" smtClean="0"/>
-              <a:t>the </a:t>
-            </a:r>
-            <a:r>
-              <a:rPr lang="en-GB" dirty="0" smtClean="0"/>
-              <a:t>classes</a:t>
-            </a:r>
-            <a:r>
-              <a:rPr lang="en-GB" dirty="0" smtClean="0"/>
-              <a:t> </a:t>
-            </a:r>
-            <a:r>
-              <a:rPr lang="en-GB" dirty="0" smtClean="0"/>
-              <a:t>that </a:t>
-            </a:r>
-            <a:r>
-              <a:rPr lang="en-GB" dirty="0" smtClean="0"/>
-              <a:t>would represent that domain object.</a:t>
+              <a:t>made to bridge analysis and design, because the majority of coding effort put in by the team is on the classes that would represent that domain object.</a:t>
             </a:r>
             <a:endParaRPr lang="en-US" dirty="0" smtClean="0"/>
           </a:p>
@@ -16612,32 +15553,16 @@
             </a:r>
             <a:r>
               <a:rPr lang="en-US" baseline="0" dirty="0" smtClean="0"/>
-              <a:t>) are values, </a:t>
-            </a:r>
+              <a:t>) are values, and those that are singletons are domain services (by which we include repositories).</a:t>
+            </a:r>
+          </a:p>
+          <a:p>
+            <a:endParaRPr lang="en-US" baseline="0" dirty="0" smtClean="0"/>
+          </a:p>
+          <a:p>
             <a:r>
               <a:rPr lang="en-US" baseline="0" dirty="0" smtClean="0"/>
-              <a:t>and those </a:t>
-            </a:r>
-            <a:r>
-              <a:rPr lang="en-US" baseline="0" dirty="0" smtClean="0"/>
-              <a:t>that are singletons are domain services (by which we include repositories).</a:t>
-            </a:r>
-          </a:p>
-          <a:p>
-            <a:endParaRPr lang="en-US" baseline="0" dirty="0" smtClean="0"/>
-          </a:p>
-          <a:p>
-            <a:r>
-              <a:rPr lang="en-US" baseline="0" dirty="0" smtClean="0"/>
-              <a:t>Over and above </a:t>
-            </a:r>
-            <a:r>
-              <a:rPr lang="en-US" baseline="0" dirty="0" smtClean="0"/>
-              <a:t>basic </a:t>
-            </a:r>
-            <a:r>
-              <a:rPr lang="en-US" baseline="0" dirty="0" smtClean="0"/>
-              <a:t>getters and setters (“know-</a:t>
+              <a:t>Over and above basic getters and setters (“know-</a:t>
             </a:r>
             <a:r>
               <a:rPr lang="en-US" baseline="0" dirty="0" err="1" smtClean="0"/>
@@ -16682,36 +15607,16 @@
           <a:p>
             <a:r>
               <a:rPr lang="en-US" dirty="0" smtClean="0"/>
-              <a:t>Isis also supports </a:t>
-            </a:r>
+              <a:t>Isis also supports “pre-condition” business rules through conventions.  A class member can be hidden; or if visible then it can be disabled (greyed out), or if enabled then the values/arguments can be validated.  We summarize this as : “(can you) see it / (can you) use it / (can you) do it”.</a:t>
+            </a:r>
+          </a:p>
+          <a:p>
+            <a:endParaRPr lang="en-US" dirty="0"/>
+          </a:p>
+          <a:p>
             <a:r>
               <a:rPr lang="en-US" dirty="0" smtClean="0"/>
-              <a:t>“pre-condition” business </a:t>
-            </a:r>
-            <a:r>
-              <a:rPr lang="en-US" dirty="0" smtClean="0"/>
-              <a:t>rules through conventions.  A class member can be hidden; or if visible then it can be disabled (greyed out), or if enabled then the values/arguments can be validated.  </a:t>
-            </a:r>
-            <a:r>
-              <a:rPr lang="en-US" dirty="0" smtClean="0"/>
-              <a:t>We summarize this as : “(can you) see it / (can you) use it / (can you) do </a:t>
-            </a:r>
-            <a:r>
-              <a:rPr lang="en-US" dirty="0" smtClean="0"/>
-              <a:t>it”.</a:t>
-            </a:r>
-          </a:p>
-          <a:p>
-            <a:endParaRPr lang="en-US" dirty="0"/>
-          </a:p>
-          <a:p>
-            <a:r>
-              <a:rPr lang="en-US" dirty="0" smtClean="0"/>
-              <a:t>Such business </a:t>
-            </a:r>
-            <a:r>
-              <a:rPr lang="en-US" dirty="0" smtClean="0"/>
-              <a:t>rules can be specified declaratively through annotations (</a:t>
+              <a:t>Such business rules can be specified declaratively through annotations (</a:t>
             </a:r>
             <a:r>
               <a:rPr lang="en-US" dirty="0" err="1" smtClean="0"/>
@@ -17404,11 +16309,7 @@
             </a:r>
             <a:r>
               <a:rPr lang="en-GB" baseline="0" dirty="0" smtClean="0"/>
-              <a:t> original thesis on Naked Objects.  There’s also Dan Haywood’s book, Domain Driven Design using Naked Objects.  This relates to the Naked Objects framework circa 2009, but applies more-or-less unchanged to Apache Isis </a:t>
-            </a:r>
-            <a:r>
-              <a:rPr lang="en-GB" baseline="0" dirty="0" smtClean="0"/>
-              <a:t>(the main difference is that the </a:t>
+              <a:t> original thesis on Naked Objects.  There’s also Dan Haywood’s book, Domain Driven Design using Naked Objects.  This relates to the Naked Objects framework circa 2009, but applies more-or-less unchanged to Apache Isis (the main difference is that the </a:t>
             </a:r>
             <a:r>
               <a:rPr lang="en-GB" baseline="0" dirty="0" err="1" smtClean="0"/>
@@ -17416,11 +16317,7 @@
             </a:r>
             <a:r>
               <a:rPr lang="en-GB" baseline="0" dirty="0" smtClean="0"/>
-              <a:t> </a:t>
-            </a:r>
-            <a:r>
-              <a:rPr lang="en-GB" baseline="0" dirty="0" smtClean="0"/>
-              <a:t>package names have changed).</a:t>
+              <a:t> package names have changed).</a:t>
             </a:r>
           </a:p>
           <a:p>
@@ -17642,7 +16539,7 @@
           <a:p>
             <a:fld id="{9140DE9F-C34A-4E23-883E-C14682627CCD}" type="datetime1">
               <a:rPr lang="en-GB" smtClean="0"/>
-              <a:t>07/02/2011</a:t>
+              <a:t>06/03/2011</a:t>
             </a:fld>
             <a:endParaRPr lang="en-GB"/>
           </a:p>
@@ -17812,7 +16709,7 @@
           <a:p>
             <a:fld id="{A1B973B2-F141-4671-BF96-850D2453B016}" type="datetime1">
               <a:rPr lang="en-GB" smtClean="0"/>
-              <a:t>07/02/2011</a:t>
+              <a:t>06/03/2011</a:t>
             </a:fld>
             <a:endParaRPr lang="en-GB"/>
           </a:p>
@@ -17992,7 +16889,7 @@
           <a:p>
             <a:fld id="{8524A507-4733-4A6E-83A9-5AB074B59BE5}" type="datetime1">
               <a:rPr lang="en-GB" smtClean="0"/>
-              <a:t>07/02/2011</a:t>
+              <a:t>06/03/2011</a:t>
             </a:fld>
             <a:endParaRPr lang="en-GB"/>
           </a:p>
@@ -18162,7 +17059,7 @@
           <a:p>
             <a:fld id="{ECDC3F93-F704-4AF7-B99C-62E2C5B7C2FE}" type="datetime1">
               <a:rPr lang="en-GB" smtClean="0"/>
-              <a:t>07/02/2011</a:t>
+              <a:t>06/03/2011</a:t>
             </a:fld>
             <a:endParaRPr lang="en-GB"/>
           </a:p>
@@ -18408,7 +17305,7 @@
           <a:p>
             <a:fld id="{56E133CD-AFB4-4FA8-BFBA-3205A0E9B706}" type="datetime1">
               <a:rPr lang="en-GB" smtClean="0"/>
-              <a:t>07/02/2011</a:t>
+              <a:t>06/03/2011</a:t>
             </a:fld>
             <a:endParaRPr lang="en-GB"/>
           </a:p>
@@ -18696,7 +17593,7 @@
           <a:p>
             <a:fld id="{41572393-BB13-42D8-90EB-A2E8E5CB00E1}" type="datetime1">
               <a:rPr lang="en-GB" smtClean="0"/>
-              <a:t>07/02/2011</a:t>
+              <a:t>06/03/2011</a:t>
             </a:fld>
             <a:endParaRPr lang="en-GB"/>
           </a:p>
@@ -19118,7 +18015,7 @@
           <a:p>
             <a:fld id="{EB4D5DAA-7195-4131-B1E3-7C8458845225}" type="datetime1">
               <a:rPr lang="en-GB" smtClean="0"/>
-              <a:t>07/02/2011</a:t>
+              <a:t>06/03/2011</a:t>
             </a:fld>
             <a:endParaRPr lang="en-GB"/>
           </a:p>
@@ -19236,7 +18133,7 @@
           <a:p>
             <a:fld id="{2F851E64-D886-4733-AD8A-CBAB7A97F6C3}" type="datetime1">
               <a:rPr lang="en-GB" smtClean="0"/>
-              <a:t>07/02/2011</a:t>
+              <a:t>06/03/2011</a:t>
             </a:fld>
             <a:endParaRPr lang="en-GB"/>
           </a:p>
@@ -19331,7 +18228,7 @@
           <a:p>
             <a:fld id="{196A47A2-EFCF-492B-8588-C6F90CC4438D}" type="datetime1">
               <a:rPr lang="en-GB" smtClean="0"/>
-              <a:t>07/02/2011</a:t>
+              <a:t>06/03/2011</a:t>
             </a:fld>
             <a:endParaRPr lang="en-GB"/>
           </a:p>
@@ -19608,7 +18505,7 @@
           <a:p>
             <a:fld id="{29BF1E9D-1B44-4F3F-8F14-FDBD2A019889}" type="datetime1">
               <a:rPr lang="en-GB" smtClean="0"/>
-              <a:t>07/02/2011</a:t>
+              <a:t>06/03/2011</a:t>
             </a:fld>
             <a:endParaRPr lang="en-GB"/>
           </a:p>
@@ -19861,7 +18758,7 @@
           <a:p>
             <a:fld id="{35EE9D4D-9023-427F-A9FA-CAB2D44288B5}" type="datetime1">
               <a:rPr lang="en-GB" smtClean="0"/>
-              <a:t>07/02/2011</a:t>
+              <a:t>06/03/2011</a:t>
             </a:fld>
             <a:endParaRPr lang="en-GB"/>
           </a:p>
@@ -20041,7 +18938,7 @@
           <a:p>
             <a:fld id="{C8398342-058C-4B74-A745-81529AEFEA68}" type="datetime1">
               <a:rPr lang="en-GB" smtClean="0"/>
-              <a:t>07/02/2011</a:t>
+              <a:t>06/03/2011</a:t>
             </a:fld>
             <a:endParaRPr lang="en-GB"/>
           </a:p>
@@ -21714,36 +20611,6 @@
           <a:chExt cx="0" cy="0"/>
         </a:xfrm>
       </p:grpSpPr>
-      <p:pic>
-        <p:nvPicPr>
-          <p:cNvPr id="2" name="Picture 1"/>
-          <p:cNvPicPr>
-            <a:picLocks noChangeAspect="1"/>
-          </p:cNvPicPr>
-          <p:nvPr/>
-        </p:nvPicPr>
-        <p:blipFill>
-          <a:blip r:embed="rId3">
-            <a:extLst>
-              <a:ext uri="{28A0092B-C50C-407E-A947-70E740481C1C}">
-                <a14:useLocalDpi xmlns:a14="http://schemas.microsoft.com/office/drawing/2010/main" val="0"/>
-              </a:ext>
-            </a:extLst>
-          </a:blip>
-          <a:stretch>
-            <a:fillRect/>
-          </a:stretch>
-        </p:blipFill>
-        <p:spPr>
-          <a:xfrm>
-            <a:off x="1331640" y="908720"/>
-            <a:ext cx="6702492" cy="4896544"/>
-          </a:xfrm>
-          <a:prstGeom prst="rect">
-            <a:avLst/>
-          </a:prstGeom>
-        </p:spPr>
-      </p:pic>
       <p:sp>
         <p:nvSpPr>
           <p:cNvPr id="4" name="Title 3"/>
@@ -21806,6 +20673,36 @@
           </a:p>
         </p:txBody>
       </p:sp>
+      <p:pic>
+        <p:nvPicPr>
+          <p:cNvPr id="3" name="Picture 2"/>
+          <p:cNvPicPr>
+            <a:picLocks noChangeAspect="1"/>
+          </p:cNvPicPr>
+          <p:nvPr/>
+        </p:nvPicPr>
+        <p:blipFill>
+          <a:blip r:embed="rId3">
+            <a:extLst>
+              <a:ext uri="{28A0092B-C50C-407E-A947-70E740481C1C}">
+                <a14:useLocalDpi xmlns:a14="http://schemas.microsoft.com/office/drawing/2010/main" val="0"/>
+              </a:ext>
+            </a:extLst>
+          </a:blip>
+          <a:stretch>
+            <a:fillRect/>
+          </a:stretch>
+        </p:blipFill>
+        <p:spPr>
+          <a:xfrm>
+            <a:off x="1202026" y="980728"/>
+            <a:ext cx="6754350" cy="4824536"/>
+          </a:xfrm>
+          <a:prstGeom prst="rect">
+            <a:avLst/>
+          </a:prstGeom>
+        </p:spPr>
+      </p:pic>
     </p:spTree>
     <p:extLst>
       <p:ext uri="{BB962C8B-B14F-4D97-AF65-F5344CB8AC3E}">
@@ -22875,7 +21772,6 @@
               <a:rPr lang="en-GB" sz="2400" dirty="0" smtClean="0"/>
               <a:t>available via Maven</a:t>
             </a:r>
-            <a:endParaRPr lang="en-GB" sz="2400" dirty="0" smtClean="0"/>
           </a:p>
           <a:p>
             <a:pPr lvl="1"/>

</xml_diff>

<commit_message>
reorg - moving profilestores under runtimes.dflt, reintroducing core.webapp and core.runtime, bumping to 0.1.2-incubating-SNAPSHOT
git-svn-id: https://svn.apache.org/repos/asf/incubator/isis/trunk@1085690 13f79535-47bb-0310-9956-ffa450edef68
</commit_message>
<xml_diff>
--- a/src/site/resources/presentations/IntroducingApacheIsis.pptx
+++ b/src/site/resources/presentations/IntroducingApacheIsis.pptx
@@ -7030,6 +7030,882 @@
       <dsp:cNvGrpSpPr/>
     </dsp:nvGrpSpPr>
     <dsp:grpSpPr/>
+    <dsp:sp modelId="{7E9DE110-E9AD-4729-A2D7-E9BE91CEE8A3}">
+      <dsp:nvSpPr>
+        <dsp:cNvPr id="0" name=""/>
+        <dsp:cNvSpPr/>
+      </dsp:nvSpPr>
+      <dsp:spPr>
+        <a:xfrm>
+          <a:off x="0" y="309183"/>
+          <a:ext cx="8215370" cy="1346625"/>
+        </a:xfrm>
+        <a:prstGeom prst="rect">
+          <a:avLst/>
+        </a:prstGeom>
+        <a:solidFill>
+          <a:schemeClr val="lt1">
+            <a:alpha val="90000"/>
+            <a:hueOff val="0"/>
+            <a:satOff val="0"/>
+            <a:lumOff val="0"/>
+            <a:alphaOff val="0"/>
+          </a:schemeClr>
+        </a:solidFill>
+        <a:ln w="9525" cap="flat" cmpd="sng" algn="ctr">
+          <a:solidFill>
+            <a:schemeClr val="accent2">
+              <a:hueOff val="0"/>
+              <a:satOff val="0"/>
+              <a:lumOff val="0"/>
+              <a:alphaOff val="0"/>
+            </a:schemeClr>
+          </a:solidFill>
+          <a:prstDash val="solid"/>
+        </a:ln>
+        <a:effectLst>
+          <a:outerShdw blurRad="40000" dist="23000" dir="5400000" rotWithShape="0">
+            <a:srgbClr val="000000">
+              <a:alpha val="35000"/>
+            </a:srgbClr>
+          </a:outerShdw>
+        </a:effectLst>
+        <a:scene3d>
+          <a:camera prst="orthographicFront"/>
+          <a:lightRig rig="flat" dir="t"/>
+        </a:scene3d>
+        <a:sp3d z="190500" extrusionH="12700" prstMaterial="plastic">
+          <a:bevelT w="50800" h="50800"/>
+        </a:sp3d>
+      </dsp:spPr>
+      <dsp:style>
+        <a:lnRef idx="1">
+          <a:scrgbClr r="0" g="0" b="0"/>
+        </a:lnRef>
+        <a:fillRef idx="1">
+          <a:scrgbClr r="0" g="0" b="0"/>
+        </a:fillRef>
+        <a:effectRef idx="2">
+          <a:scrgbClr r="0" g="0" b="0"/>
+        </a:effectRef>
+        <a:fontRef idx="minor"/>
+      </dsp:style>
+      <dsp:txBody>
+        <a:bodyPr spcFirstLastPara="0" vert="horz" wrap="square" lIns="637604" tIns="312420" rIns="637604" bIns="106680" numCol="1" spcCol="1270" anchor="t" anchorCtr="0">
+          <a:noAutofit/>
+        </a:bodyPr>
+        <a:lstStyle/>
+        <a:p>
+          <a:pPr marL="114300" lvl="1" indent="-114300" algn="l" defTabSz="666750">
+            <a:lnSpc>
+              <a:spcPct val="90000"/>
+            </a:lnSpc>
+            <a:spcBef>
+              <a:spcPct val="0"/>
+            </a:spcBef>
+            <a:spcAft>
+              <a:spcPct val="15000"/>
+            </a:spcAft>
+            <a:buChar char="••"/>
+          </a:pPr>
+          <a:r>
+            <a:rPr lang="en-US" sz="1500" kern="1200" dirty="0" smtClean="0"/>
+            <a:t>One of the purest examples of domain-driven design for a large-scale transactional business application, anywhere in the world</a:t>
+          </a:r>
+          <a:endParaRPr lang="en-GB" sz="1500" kern="1200" dirty="0"/>
+        </a:p>
+        <a:p>
+          <a:pPr marL="114300" lvl="1" indent="-114300" algn="l" defTabSz="666750">
+            <a:lnSpc>
+              <a:spcPct val="90000"/>
+            </a:lnSpc>
+            <a:spcBef>
+              <a:spcPct val="0"/>
+            </a:spcBef>
+            <a:spcAft>
+              <a:spcPct val="15000"/>
+            </a:spcAft>
+            <a:buChar char="••"/>
+          </a:pPr>
+          <a:r>
+            <a:rPr lang="en-US" sz="1500" kern="1200" dirty="0" smtClean="0"/>
+            <a:t>Extreme re-use and sharing of objects between applications</a:t>
+          </a:r>
+          <a:endParaRPr lang="en-GB" sz="1500" kern="1200" dirty="0"/>
+        </a:p>
+        <a:p>
+          <a:pPr marL="114300" lvl="1" indent="-114300" algn="l" defTabSz="666750">
+            <a:lnSpc>
+              <a:spcPct val="90000"/>
+            </a:lnSpc>
+            <a:spcBef>
+              <a:spcPct val="0"/>
+            </a:spcBef>
+            <a:spcAft>
+              <a:spcPct val="15000"/>
+            </a:spcAft>
+            <a:buChar char="••"/>
+          </a:pPr>
+          <a:r>
+            <a:rPr lang="en-GB" sz="1500" kern="1200" dirty="0" smtClean="0"/>
+            <a:t>Enables easy modification in response to changing business requirements</a:t>
+          </a:r>
+          <a:endParaRPr lang="en-US" sz="1500" kern="1200" dirty="0"/>
+        </a:p>
+      </dsp:txBody>
+      <dsp:txXfrm>
+        <a:off x="0" y="309183"/>
+        <a:ext cx="8215370" cy="1346625"/>
+      </dsp:txXfrm>
+    </dsp:sp>
+    <dsp:sp modelId="{1889FF86-9751-4093-BBB8-3F4924CACDD1}">
+      <dsp:nvSpPr>
+        <dsp:cNvPr id="0" name=""/>
+        <dsp:cNvSpPr/>
+      </dsp:nvSpPr>
+      <dsp:spPr>
+        <a:xfrm>
+          <a:off x="410768" y="87783"/>
+          <a:ext cx="5750759" cy="442800"/>
+        </a:xfrm>
+        <a:prstGeom prst="roundRect">
+          <a:avLst/>
+        </a:prstGeom>
+        <a:gradFill rotWithShape="0">
+          <a:gsLst>
+            <a:gs pos="0">
+              <a:schemeClr val="accent2">
+                <a:hueOff val="0"/>
+                <a:satOff val="0"/>
+                <a:lumOff val="0"/>
+                <a:alphaOff val="0"/>
+                <a:shade val="51000"/>
+                <a:satMod val="130000"/>
+              </a:schemeClr>
+            </a:gs>
+            <a:gs pos="80000">
+              <a:schemeClr val="accent2">
+                <a:hueOff val="0"/>
+                <a:satOff val="0"/>
+                <a:lumOff val="0"/>
+                <a:alphaOff val="0"/>
+                <a:shade val="93000"/>
+                <a:satMod val="130000"/>
+              </a:schemeClr>
+            </a:gs>
+            <a:gs pos="100000">
+              <a:schemeClr val="accent2">
+                <a:hueOff val="0"/>
+                <a:satOff val="0"/>
+                <a:lumOff val="0"/>
+                <a:alphaOff val="0"/>
+                <a:shade val="94000"/>
+                <a:satMod val="135000"/>
+              </a:schemeClr>
+            </a:gs>
+          </a:gsLst>
+          <a:lin ang="16200000" scaled="0"/>
+        </a:gradFill>
+        <a:ln>
+          <a:noFill/>
+        </a:ln>
+        <a:effectLst>
+          <a:outerShdw blurRad="40000" dist="23000" dir="5400000" rotWithShape="0">
+            <a:srgbClr val="000000">
+              <a:alpha val="35000"/>
+            </a:srgbClr>
+          </a:outerShdw>
+        </a:effectLst>
+        <a:scene3d>
+          <a:camera prst="orthographicFront"/>
+          <a:lightRig rig="flat" dir="t"/>
+        </a:scene3d>
+        <a:sp3d prstMaterial="plastic">
+          <a:bevelT w="120900" h="88900"/>
+          <a:bevelB w="88900" h="31750" prst="angle"/>
+        </a:sp3d>
+      </dsp:spPr>
+      <dsp:style>
+        <a:lnRef idx="0">
+          <a:scrgbClr r="0" g="0" b="0"/>
+        </a:lnRef>
+        <a:fillRef idx="3">
+          <a:scrgbClr r="0" g="0" b="0"/>
+        </a:fillRef>
+        <a:effectRef idx="2">
+          <a:scrgbClr r="0" g="0" b="0"/>
+        </a:effectRef>
+        <a:fontRef idx="minor">
+          <a:schemeClr val="lt1"/>
+        </a:fontRef>
+      </dsp:style>
+      <dsp:txBody>
+        <a:bodyPr spcFirstLastPara="0" vert="horz" wrap="square" lIns="217365" tIns="0" rIns="217365" bIns="0" numCol="1" spcCol="1270" anchor="ctr" anchorCtr="0">
+          <a:noAutofit/>
+        </a:bodyPr>
+        <a:lstStyle/>
+        <a:p>
+          <a:pPr lvl="0" algn="l" defTabSz="666750">
+            <a:lnSpc>
+              <a:spcPct val="90000"/>
+            </a:lnSpc>
+            <a:spcBef>
+              <a:spcPct val="0"/>
+            </a:spcBef>
+            <a:spcAft>
+              <a:spcPct val="35000"/>
+            </a:spcAft>
+          </a:pPr>
+          <a:r>
+            <a:rPr lang="en-GB" sz="1500" kern="1200" dirty="0" smtClean="0"/>
+            <a:t>Domain-driven design</a:t>
+          </a:r>
+          <a:endParaRPr lang="en-GB" sz="1500" kern="1200" dirty="0"/>
+        </a:p>
+      </dsp:txBody>
+      <dsp:txXfrm>
+        <a:off x="432384" y="109399"/>
+        <a:ext cx="5707527" cy="399568"/>
+      </dsp:txXfrm>
+    </dsp:sp>
+    <dsp:sp modelId="{20F157B5-E271-446E-8E5B-B1E860AC53F7}">
+      <dsp:nvSpPr>
+        <dsp:cNvPr id="0" name=""/>
+        <dsp:cNvSpPr/>
+      </dsp:nvSpPr>
+      <dsp:spPr>
+        <a:xfrm>
+          <a:off x="0" y="1958209"/>
+          <a:ext cx="8215370" cy="850500"/>
+        </a:xfrm>
+        <a:prstGeom prst="rect">
+          <a:avLst/>
+        </a:prstGeom>
+        <a:solidFill>
+          <a:schemeClr val="lt1">
+            <a:alpha val="90000"/>
+            <a:hueOff val="0"/>
+            <a:satOff val="0"/>
+            <a:lumOff val="0"/>
+            <a:alphaOff val="0"/>
+          </a:schemeClr>
+        </a:solidFill>
+        <a:ln w="9525" cap="flat" cmpd="sng" algn="ctr">
+          <a:solidFill>
+            <a:schemeClr val="accent3">
+              <a:hueOff val="0"/>
+              <a:satOff val="0"/>
+              <a:lumOff val="0"/>
+              <a:alphaOff val="0"/>
+            </a:schemeClr>
+          </a:solidFill>
+          <a:prstDash val="solid"/>
+        </a:ln>
+        <a:effectLst>
+          <a:outerShdw blurRad="40000" dist="23000" dir="5400000" rotWithShape="0">
+            <a:srgbClr val="000000">
+              <a:alpha val="35000"/>
+            </a:srgbClr>
+          </a:outerShdw>
+        </a:effectLst>
+        <a:scene3d>
+          <a:camera prst="orthographicFront"/>
+          <a:lightRig rig="flat" dir="t"/>
+        </a:scene3d>
+        <a:sp3d z="190500" extrusionH="12700" prstMaterial="plastic">
+          <a:bevelT w="50800" h="50800"/>
+        </a:sp3d>
+      </dsp:spPr>
+      <dsp:style>
+        <a:lnRef idx="1">
+          <a:scrgbClr r="0" g="0" b="0"/>
+        </a:lnRef>
+        <a:fillRef idx="1">
+          <a:scrgbClr r="0" g="0" b="0"/>
+        </a:fillRef>
+        <a:effectRef idx="2">
+          <a:scrgbClr r="0" g="0" b="0"/>
+        </a:effectRef>
+        <a:fontRef idx="minor"/>
+      </dsp:style>
+      <dsp:txBody>
+        <a:bodyPr spcFirstLastPara="0" vert="horz" wrap="square" lIns="637604" tIns="312420" rIns="637604" bIns="106680" numCol="1" spcCol="1270" anchor="t" anchorCtr="0">
+          <a:noAutofit/>
+        </a:bodyPr>
+        <a:lstStyle/>
+        <a:p>
+          <a:pPr marL="114300" lvl="1" indent="-114300" algn="l" defTabSz="666750">
+            <a:lnSpc>
+              <a:spcPct val="90000"/>
+            </a:lnSpc>
+            <a:spcBef>
+              <a:spcPct val="0"/>
+            </a:spcBef>
+            <a:spcAft>
+              <a:spcPct val="15000"/>
+            </a:spcAft>
+            <a:buChar char="••"/>
+          </a:pPr>
+          <a:r>
+            <a:rPr lang="en-US" sz="1500" kern="1200" dirty="0" smtClean="0"/>
+            <a:t>Possibly the first large-scale application of agile development within the public sector, anywhere in the world</a:t>
+          </a:r>
+          <a:endParaRPr lang="en-GB" sz="1500" kern="1200" dirty="0"/>
+        </a:p>
+      </dsp:txBody>
+      <dsp:txXfrm>
+        <a:off x="0" y="1958209"/>
+        <a:ext cx="8215370" cy="850500"/>
+      </dsp:txXfrm>
+    </dsp:sp>
+    <dsp:sp modelId="{1AB0CF3B-353D-491D-93B3-DCD601C66E89}">
+      <dsp:nvSpPr>
+        <dsp:cNvPr id="0" name=""/>
+        <dsp:cNvSpPr/>
+      </dsp:nvSpPr>
+      <dsp:spPr>
+        <a:xfrm>
+          <a:off x="410768" y="1736809"/>
+          <a:ext cx="5750759" cy="442800"/>
+        </a:xfrm>
+        <a:prstGeom prst="roundRect">
+          <a:avLst/>
+        </a:prstGeom>
+        <a:gradFill rotWithShape="0">
+          <a:gsLst>
+            <a:gs pos="0">
+              <a:schemeClr val="accent3">
+                <a:hueOff val="0"/>
+                <a:satOff val="0"/>
+                <a:lumOff val="0"/>
+                <a:alphaOff val="0"/>
+                <a:shade val="51000"/>
+                <a:satMod val="130000"/>
+              </a:schemeClr>
+            </a:gs>
+            <a:gs pos="80000">
+              <a:schemeClr val="accent3">
+                <a:hueOff val="0"/>
+                <a:satOff val="0"/>
+                <a:lumOff val="0"/>
+                <a:alphaOff val="0"/>
+                <a:shade val="93000"/>
+                <a:satMod val="130000"/>
+              </a:schemeClr>
+            </a:gs>
+            <a:gs pos="100000">
+              <a:schemeClr val="accent3">
+                <a:hueOff val="0"/>
+                <a:satOff val="0"/>
+                <a:lumOff val="0"/>
+                <a:alphaOff val="0"/>
+                <a:shade val="94000"/>
+                <a:satMod val="135000"/>
+              </a:schemeClr>
+            </a:gs>
+          </a:gsLst>
+          <a:lin ang="16200000" scaled="0"/>
+        </a:gradFill>
+        <a:ln>
+          <a:noFill/>
+        </a:ln>
+        <a:effectLst>
+          <a:outerShdw blurRad="40000" dist="23000" dir="5400000" rotWithShape="0">
+            <a:srgbClr val="000000">
+              <a:alpha val="35000"/>
+            </a:srgbClr>
+          </a:outerShdw>
+        </a:effectLst>
+        <a:scene3d>
+          <a:camera prst="orthographicFront"/>
+          <a:lightRig rig="flat" dir="t"/>
+        </a:scene3d>
+        <a:sp3d prstMaterial="plastic">
+          <a:bevelT w="120900" h="88900"/>
+          <a:bevelB w="88900" h="31750" prst="angle"/>
+        </a:sp3d>
+      </dsp:spPr>
+      <dsp:style>
+        <a:lnRef idx="0">
+          <a:scrgbClr r="0" g="0" b="0"/>
+        </a:lnRef>
+        <a:fillRef idx="3">
+          <a:scrgbClr r="0" g="0" b="0"/>
+        </a:fillRef>
+        <a:effectRef idx="2">
+          <a:scrgbClr r="0" g="0" b="0"/>
+        </a:effectRef>
+        <a:fontRef idx="minor">
+          <a:schemeClr val="lt1"/>
+        </a:fontRef>
+      </dsp:style>
+      <dsp:txBody>
+        <a:bodyPr spcFirstLastPara="0" vert="horz" wrap="square" lIns="217365" tIns="0" rIns="217365" bIns="0" numCol="1" spcCol="1270" anchor="ctr" anchorCtr="0">
+          <a:noAutofit/>
+        </a:bodyPr>
+        <a:lstStyle/>
+        <a:p>
+          <a:pPr lvl="0" algn="l" defTabSz="666750">
+            <a:lnSpc>
+              <a:spcPct val="90000"/>
+            </a:lnSpc>
+            <a:spcBef>
+              <a:spcPct val="0"/>
+            </a:spcBef>
+            <a:spcAft>
+              <a:spcPct val="35000"/>
+            </a:spcAft>
+          </a:pPr>
+          <a:r>
+            <a:rPr lang="en-GB" sz="1500" kern="1200" dirty="0" smtClean="0"/>
+            <a:t>Agile Development</a:t>
+          </a:r>
+          <a:endParaRPr lang="en-GB" sz="1500" kern="1200" dirty="0"/>
+        </a:p>
+      </dsp:txBody>
+      <dsp:txXfrm>
+        <a:off x="432384" y="1758425"/>
+        <a:ext cx="5707527" cy="399568"/>
+      </dsp:txXfrm>
+    </dsp:sp>
+    <dsp:sp modelId="{528C29A9-283C-40E8-AFF6-B7739F2DA789}">
+      <dsp:nvSpPr>
+        <dsp:cNvPr id="0" name=""/>
+        <dsp:cNvSpPr/>
+      </dsp:nvSpPr>
+      <dsp:spPr>
+        <a:xfrm>
+          <a:off x="0" y="3111109"/>
+          <a:ext cx="8215370" cy="637875"/>
+        </a:xfrm>
+        <a:prstGeom prst="rect">
+          <a:avLst/>
+        </a:prstGeom>
+        <a:solidFill>
+          <a:schemeClr val="lt1">
+            <a:alpha val="90000"/>
+            <a:hueOff val="0"/>
+            <a:satOff val="0"/>
+            <a:lumOff val="0"/>
+            <a:alphaOff val="0"/>
+          </a:schemeClr>
+        </a:solidFill>
+        <a:ln w="9525" cap="flat" cmpd="sng" algn="ctr">
+          <a:solidFill>
+            <a:schemeClr val="accent4">
+              <a:hueOff val="0"/>
+              <a:satOff val="0"/>
+              <a:lumOff val="0"/>
+              <a:alphaOff val="0"/>
+            </a:schemeClr>
+          </a:solidFill>
+          <a:prstDash val="solid"/>
+        </a:ln>
+        <a:effectLst>
+          <a:outerShdw blurRad="40000" dist="23000" dir="5400000" rotWithShape="0">
+            <a:srgbClr val="000000">
+              <a:alpha val="35000"/>
+            </a:srgbClr>
+          </a:outerShdw>
+        </a:effectLst>
+        <a:scene3d>
+          <a:camera prst="orthographicFront"/>
+          <a:lightRig rig="flat" dir="t"/>
+        </a:scene3d>
+        <a:sp3d z="190500" extrusionH="12700" prstMaterial="plastic">
+          <a:bevelT w="50800" h="50800"/>
+        </a:sp3d>
+      </dsp:spPr>
+      <dsp:style>
+        <a:lnRef idx="1">
+          <a:scrgbClr r="0" g="0" b="0"/>
+        </a:lnRef>
+        <a:fillRef idx="1">
+          <a:scrgbClr r="0" g="0" b="0"/>
+        </a:fillRef>
+        <a:effectRef idx="2">
+          <a:scrgbClr r="0" g="0" b="0"/>
+        </a:effectRef>
+        <a:fontRef idx="minor"/>
+      </dsp:style>
+      <dsp:txBody>
+        <a:bodyPr spcFirstLastPara="0" vert="horz" wrap="square" lIns="637604" tIns="312420" rIns="637604" bIns="106680" numCol="1" spcCol="1270" anchor="t" anchorCtr="0">
+          <a:noAutofit/>
+        </a:bodyPr>
+        <a:lstStyle/>
+        <a:p>
+          <a:pPr marL="114300" lvl="1" indent="-114300" algn="l" defTabSz="666750">
+            <a:lnSpc>
+              <a:spcPct val="90000"/>
+            </a:lnSpc>
+            <a:spcBef>
+              <a:spcPct val="0"/>
+            </a:spcBef>
+            <a:spcAft>
+              <a:spcPct val="15000"/>
+            </a:spcAft>
+            <a:buChar char="••"/>
+          </a:pPr>
+          <a:r>
+            <a:rPr lang="en-US" sz="1500" kern="1200" dirty="0" smtClean="0"/>
+            <a:t>A rich user interface to a core transactional business system</a:t>
+          </a:r>
+          <a:endParaRPr lang="en-GB" sz="1500" kern="1200" dirty="0"/>
+        </a:p>
+      </dsp:txBody>
+      <dsp:txXfrm>
+        <a:off x="0" y="3111109"/>
+        <a:ext cx="8215370" cy="637875"/>
+      </dsp:txXfrm>
+    </dsp:sp>
+    <dsp:sp modelId="{A729A4AA-1975-479E-8A2C-6D34C13E758E}">
+      <dsp:nvSpPr>
+        <dsp:cNvPr id="0" name=""/>
+        <dsp:cNvSpPr/>
+      </dsp:nvSpPr>
+      <dsp:spPr>
+        <a:xfrm>
+          <a:off x="410768" y="2889709"/>
+          <a:ext cx="5750759" cy="442800"/>
+        </a:xfrm>
+        <a:prstGeom prst="roundRect">
+          <a:avLst/>
+        </a:prstGeom>
+        <a:gradFill rotWithShape="0">
+          <a:gsLst>
+            <a:gs pos="0">
+              <a:schemeClr val="accent4">
+                <a:hueOff val="0"/>
+                <a:satOff val="0"/>
+                <a:lumOff val="0"/>
+                <a:alphaOff val="0"/>
+                <a:shade val="51000"/>
+                <a:satMod val="130000"/>
+              </a:schemeClr>
+            </a:gs>
+            <a:gs pos="80000">
+              <a:schemeClr val="accent4">
+                <a:hueOff val="0"/>
+                <a:satOff val="0"/>
+                <a:lumOff val="0"/>
+                <a:alphaOff val="0"/>
+                <a:shade val="93000"/>
+                <a:satMod val="130000"/>
+              </a:schemeClr>
+            </a:gs>
+            <a:gs pos="100000">
+              <a:schemeClr val="accent4">
+                <a:hueOff val="0"/>
+                <a:satOff val="0"/>
+                <a:lumOff val="0"/>
+                <a:alphaOff val="0"/>
+                <a:shade val="94000"/>
+                <a:satMod val="135000"/>
+              </a:schemeClr>
+            </a:gs>
+          </a:gsLst>
+          <a:lin ang="16200000" scaled="0"/>
+        </a:gradFill>
+        <a:ln>
+          <a:noFill/>
+        </a:ln>
+        <a:effectLst>
+          <a:outerShdw blurRad="40000" dist="23000" dir="5400000" rotWithShape="0">
+            <a:srgbClr val="000000">
+              <a:alpha val="35000"/>
+            </a:srgbClr>
+          </a:outerShdw>
+        </a:effectLst>
+        <a:scene3d>
+          <a:camera prst="orthographicFront"/>
+          <a:lightRig rig="flat" dir="t"/>
+        </a:scene3d>
+        <a:sp3d prstMaterial="plastic">
+          <a:bevelT w="120900" h="88900"/>
+          <a:bevelB w="88900" h="31750" prst="angle"/>
+        </a:sp3d>
+      </dsp:spPr>
+      <dsp:style>
+        <a:lnRef idx="0">
+          <a:scrgbClr r="0" g="0" b="0"/>
+        </a:lnRef>
+        <a:fillRef idx="3">
+          <a:scrgbClr r="0" g="0" b="0"/>
+        </a:fillRef>
+        <a:effectRef idx="2">
+          <a:scrgbClr r="0" g="0" b="0"/>
+        </a:effectRef>
+        <a:fontRef idx="minor">
+          <a:schemeClr val="lt1"/>
+        </a:fontRef>
+      </dsp:style>
+      <dsp:txBody>
+        <a:bodyPr spcFirstLastPara="0" vert="horz" wrap="square" lIns="217365" tIns="0" rIns="217365" bIns="0" numCol="1" spcCol="1270" anchor="ctr" anchorCtr="0">
+          <a:noAutofit/>
+        </a:bodyPr>
+        <a:lstStyle/>
+        <a:p>
+          <a:pPr lvl="0" algn="l" defTabSz="666750">
+            <a:lnSpc>
+              <a:spcPct val="90000"/>
+            </a:lnSpc>
+            <a:spcBef>
+              <a:spcPct val="0"/>
+            </a:spcBef>
+            <a:spcAft>
+              <a:spcPct val="35000"/>
+            </a:spcAft>
+          </a:pPr>
+          <a:r>
+            <a:rPr lang="en-GB" sz="1500" kern="1200" dirty="0" smtClean="0"/>
+            <a:t>Empowered Users</a:t>
+          </a:r>
+          <a:endParaRPr lang="en-GB" sz="1500" kern="1200" dirty="0"/>
+        </a:p>
+      </dsp:txBody>
+      <dsp:txXfrm>
+        <a:off x="432384" y="2911325"/>
+        <a:ext cx="5707527" cy="399568"/>
+      </dsp:txXfrm>
+    </dsp:sp>
+    <dsp:sp modelId="{801468B0-FD5A-4080-9512-224DEA6DDD3B}">
+      <dsp:nvSpPr>
+        <dsp:cNvPr id="0" name=""/>
+        <dsp:cNvSpPr/>
+      </dsp:nvSpPr>
+      <dsp:spPr>
+        <a:xfrm>
+          <a:off x="0" y="4051384"/>
+          <a:ext cx="8215370" cy="1134000"/>
+        </a:xfrm>
+        <a:prstGeom prst="rect">
+          <a:avLst/>
+        </a:prstGeom>
+        <a:solidFill>
+          <a:schemeClr val="lt1">
+            <a:alpha val="90000"/>
+            <a:hueOff val="0"/>
+            <a:satOff val="0"/>
+            <a:lumOff val="0"/>
+            <a:alphaOff val="0"/>
+          </a:schemeClr>
+        </a:solidFill>
+        <a:ln w="9525" cap="flat" cmpd="sng" algn="ctr">
+          <a:solidFill>
+            <a:schemeClr val="accent5">
+              <a:hueOff val="0"/>
+              <a:satOff val="0"/>
+              <a:lumOff val="0"/>
+              <a:alphaOff val="0"/>
+            </a:schemeClr>
+          </a:solidFill>
+          <a:prstDash val="solid"/>
+        </a:ln>
+        <a:effectLst>
+          <a:outerShdw blurRad="40000" dist="23000" dir="5400000" rotWithShape="0">
+            <a:srgbClr val="000000">
+              <a:alpha val="35000"/>
+            </a:srgbClr>
+          </a:outerShdw>
+        </a:effectLst>
+        <a:scene3d>
+          <a:camera prst="orthographicFront"/>
+          <a:lightRig rig="flat" dir="t"/>
+        </a:scene3d>
+        <a:sp3d z="190500" extrusionH="12700" prstMaterial="plastic">
+          <a:bevelT w="50800" h="50800"/>
+        </a:sp3d>
+      </dsp:spPr>
+      <dsp:style>
+        <a:lnRef idx="1">
+          <a:scrgbClr r="0" g="0" b="0"/>
+        </a:lnRef>
+        <a:fillRef idx="1">
+          <a:scrgbClr r="0" g="0" b="0"/>
+        </a:fillRef>
+        <a:effectRef idx="2">
+          <a:scrgbClr r="0" g="0" b="0"/>
+        </a:effectRef>
+        <a:fontRef idx="minor"/>
+      </dsp:style>
+      <dsp:txBody>
+        <a:bodyPr spcFirstLastPara="0" vert="horz" wrap="square" lIns="637604" tIns="312420" rIns="637604" bIns="106680" numCol="1" spcCol="1270" anchor="t" anchorCtr="0">
+          <a:noAutofit/>
+        </a:bodyPr>
+        <a:lstStyle/>
+        <a:p>
+          <a:pPr marL="114300" lvl="1" indent="-114300" algn="l" defTabSz="666750">
+            <a:lnSpc>
+              <a:spcPct val="90000"/>
+            </a:lnSpc>
+            <a:spcBef>
+              <a:spcPct val="0"/>
+            </a:spcBef>
+            <a:spcAft>
+              <a:spcPct val="15000"/>
+            </a:spcAft>
+            <a:buChar char="••"/>
+          </a:pPr>
+          <a:r>
+            <a:rPr lang="en-US" sz="1500" kern="1200" dirty="0" smtClean="0"/>
+            <a:t>User interfaces 100% auto-generated from the underlying business objects</a:t>
+          </a:r>
+          <a:endParaRPr lang="en-GB" sz="1500" kern="1200" dirty="0"/>
+        </a:p>
+        <a:p>
+          <a:pPr marL="228600" lvl="2" indent="-114300" algn="l" defTabSz="666750">
+            <a:lnSpc>
+              <a:spcPct val="90000"/>
+            </a:lnSpc>
+            <a:spcBef>
+              <a:spcPct val="0"/>
+            </a:spcBef>
+            <a:spcAft>
+              <a:spcPct val="15000"/>
+            </a:spcAft>
+            <a:buChar char="••"/>
+          </a:pPr>
+          <a:r>
+            <a:rPr lang="en-US" sz="1500" kern="1200" dirty="0" smtClean="0"/>
+            <a:t>with no custom coding to write or to maintain</a:t>
+          </a:r>
+          <a:endParaRPr lang="en-US" sz="1500" kern="1200" dirty="0"/>
+        </a:p>
+        <a:p>
+          <a:pPr marL="114300" lvl="1" indent="-114300" algn="l" defTabSz="666750">
+            <a:lnSpc>
+              <a:spcPct val="90000"/>
+            </a:lnSpc>
+            <a:spcBef>
+              <a:spcPct val="0"/>
+            </a:spcBef>
+            <a:spcAft>
+              <a:spcPct val="15000"/>
+            </a:spcAft>
+            <a:buChar char="••"/>
+          </a:pPr>
+          <a:r>
+            <a:rPr lang="en-US" sz="1500" kern="1200" dirty="0" smtClean="0"/>
+            <a:t>More opportunity to explore domain than otherwise possible</a:t>
+          </a:r>
+          <a:endParaRPr lang="en-US" sz="1500" kern="1200" dirty="0"/>
+        </a:p>
+      </dsp:txBody>
+      <dsp:txXfrm>
+        <a:off x="0" y="4051384"/>
+        <a:ext cx="8215370" cy="1134000"/>
+      </dsp:txXfrm>
+    </dsp:sp>
+    <dsp:sp modelId="{08BC86D2-E558-474B-B1C4-E4B2BCE4CD01}">
+      <dsp:nvSpPr>
+        <dsp:cNvPr id="0" name=""/>
+        <dsp:cNvSpPr/>
+      </dsp:nvSpPr>
+      <dsp:spPr>
+        <a:xfrm>
+          <a:off x="410768" y="3829984"/>
+          <a:ext cx="5750759" cy="442800"/>
+        </a:xfrm>
+        <a:prstGeom prst="roundRect">
+          <a:avLst/>
+        </a:prstGeom>
+        <a:gradFill rotWithShape="0">
+          <a:gsLst>
+            <a:gs pos="0">
+              <a:schemeClr val="accent5">
+                <a:hueOff val="0"/>
+                <a:satOff val="0"/>
+                <a:lumOff val="0"/>
+                <a:alphaOff val="0"/>
+                <a:shade val="51000"/>
+                <a:satMod val="130000"/>
+              </a:schemeClr>
+            </a:gs>
+            <a:gs pos="80000">
+              <a:schemeClr val="accent5">
+                <a:hueOff val="0"/>
+                <a:satOff val="0"/>
+                <a:lumOff val="0"/>
+                <a:alphaOff val="0"/>
+                <a:shade val="93000"/>
+                <a:satMod val="130000"/>
+              </a:schemeClr>
+            </a:gs>
+            <a:gs pos="100000">
+              <a:schemeClr val="accent5">
+                <a:hueOff val="0"/>
+                <a:satOff val="0"/>
+                <a:lumOff val="0"/>
+                <a:alphaOff val="0"/>
+                <a:shade val="94000"/>
+                <a:satMod val="135000"/>
+              </a:schemeClr>
+            </a:gs>
+          </a:gsLst>
+          <a:lin ang="16200000" scaled="0"/>
+        </a:gradFill>
+        <a:ln>
+          <a:noFill/>
+        </a:ln>
+        <a:effectLst>
+          <a:outerShdw blurRad="40000" dist="23000" dir="5400000" rotWithShape="0">
+            <a:srgbClr val="000000">
+              <a:alpha val="35000"/>
+            </a:srgbClr>
+          </a:outerShdw>
+        </a:effectLst>
+        <a:scene3d>
+          <a:camera prst="orthographicFront"/>
+          <a:lightRig rig="flat" dir="t"/>
+        </a:scene3d>
+        <a:sp3d prstMaterial="plastic">
+          <a:bevelT w="120900" h="88900"/>
+          <a:bevelB w="88900" h="31750" prst="angle"/>
+        </a:sp3d>
+      </dsp:spPr>
+      <dsp:style>
+        <a:lnRef idx="0">
+          <a:scrgbClr r="0" g="0" b="0"/>
+        </a:lnRef>
+        <a:fillRef idx="3">
+          <a:scrgbClr r="0" g="0" b="0"/>
+        </a:fillRef>
+        <a:effectRef idx="2">
+          <a:scrgbClr r="0" g="0" b="0"/>
+        </a:effectRef>
+        <a:fontRef idx="minor">
+          <a:schemeClr val="lt1"/>
+        </a:fontRef>
+      </dsp:style>
+      <dsp:txBody>
+        <a:bodyPr spcFirstLastPara="0" vert="horz" wrap="square" lIns="217365" tIns="0" rIns="217365" bIns="0" numCol="1" spcCol="1270" anchor="ctr" anchorCtr="0">
+          <a:noAutofit/>
+        </a:bodyPr>
+        <a:lstStyle/>
+        <a:p>
+          <a:pPr lvl="0" algn="l" defTabSz="666750">
+            <a:lnSpc>
+              <a:spcPct val="90000"/>
+            </a:lnSpc>
+            <a:spcBef>
+              <a:spcPct val="0"/>
+            </a:spcBef>
+            <a:spcAft>
+              <a:spcPct val="35000"/>
+            </a:spcAft>
+          </a:pPr>
+          <a:r>
+            <a:rPr lang="en-US" sz="1500" kern="1200" dirty="0" smtClean="0"/>
+            <a:t>Powerful &amp; Productive Environment</a:t>
+          </a:r>
+          <a:endParaRPr lang="en-US" sz="1500" kern="1200" dirty="0"/>
+        </a:p>
+      </dsp:txBody>
+      <dsp:txXfrm>
+        <a:off x="432384" y="3851600"/>
+        <a:ext cx="5707527" cy="399568"/>
+      </dsp:txXfrm>
+    </dsp:sp>
   </dsp:spTree>
 </dsp:drawing>
 </file>
@@ -13349,7 +14225,7 @@
           <a:p>
             <a:fld id="{D57AE76F-E67D-4E52-B4AA-F889744E4B89}" type="datetimeFigureOut">
               <a:rPr lang="en-GB" smtClean="0"/>
-              <a:t>06/03/2011</a:t>
+              <a:t>26/03/2011</a:t>
             </a:fld>
             <a:endParaRPr lang="en-GB"/>
           </a:p>
@@ -13519,7 +14395,7 @@
           <a:p>
             <a:fld id="{FC993C7B-7F8B-4B8A-9D83-E8C0718AE1FC}" type="datetimeFigureOut">
               <a:rPr lang="en-GB" smtClean="0"/>
-              <a:t>06/03/2011</a:t>
+              <a:t>26/03/2011</a:t>
             </a:fld>
             <a:endParaRPr lang="en-GB"/>
           </a:p>
@@ -16539,7 +17415,7 @@
           <a:p>
             <a:fld id="{9140DE9F-C34A-4E23-883E-C14682627CCD}" type="datetime1">
               <a:rPr lang="en-GB" smtClean="0"/>
-              <a:t>06/03/2011</a:t>
+              <a:t>26/03/2011</a:t>
             </a:fld>
             <a:endParaRPr lang="en-GB"/>
           </a:p>
@@ -16709,7 +17585,7 @@
           <a:p>
             <a:fld id="{A1B973B2-F141-4671-BF96-850D2453B016}" type="datetime1">
               <a:rPr lang="en-GB" smtClean="0"/>
-              <a:t>06/03/2011</a:t>
+              <a:t>26/03/2011</a:t>
             </a:fld>
             <a:endParaRPr lang="en-GB"/>
           </a:p>
@@ -16889,7 +17765,7 @@
           <a:p>
             <a:fld id="{8524A507-4733-4A6E-83A9-5AB074B59BE5}" type="datetime1">
               <a:rPr lang="en-GB" smtClean="0"/>
-              <a:t>06/03/2011</a:t>
+              <a:t>26/03/2011</a:t>
             </a:fld>
             <a:endParaRPr lang="en-GB"/>
           </a:p>
@@ -17059,7 +17935,7 @@
           <a:p>
             <a:fld id="{ECDC3F93-F704-4AF7-B99C-62E2C5B7C2FE}" type="datetime1">
               <a:rPr lang="en-GB" smtClean="0"/>
-              <a:t>06/03/2011</a:t>
+              <a:t>26/03/2011</a:t>
             </a:fld>
             <a:endParaRPr lang="en-GB"/>
           </a:p>
@@ -17305,7 +18181,7 @@
           <a:p>
             <a:fld id="{56E133CD-AFB4-4FA8-BFBA-3205A0E9B706}" type="datetime1">
               <a:rPr lang="en-GB" smtClean="0"/>
-              <a:t>06/03/2011</a:t>
+              <a:t>26/03/2011</a:t>
             </a:fld>
             <a:endParaRPr lang="en-GB"/>
           </a:p>
@@ -17593,7 +18469,7 @@
           <a:p>
             <a:fld id="{41572393-BB13-42D8-90EB-A2E8E5CB00E1}" type="datetime1">
               <a:rPr lang="en-GB" smtClean="0"/>
-              <a:t>06/03/2011</a:t>
+              <a:t>26/03/2011</a:t>
             </a:fld>
             <a:endParaRPr lang="en-GB"/>
           </a:p>
@@ -18015,7 +18891,7 @@
           <a:p>
             <a:fld id="{EB4D5DAA-7195-4131-B1E3-7C8458845225}" type="datetime1">
               <a:rPr lang="en-GB" smtClean="0"/>
-              <a:t>06/03/2011</a:t>
+              <a:t>26/03/2011</a:t>
             </a:fld>
             <a:endParaRPr lang="en-GB"/>
           </a:p>
@@ -18133,7 +19009,7 @@
           <a:p>
             <a:fld id="{2F851E64-D886-4733-AD8A-CBAB7A97F6C3}" type="datetime1">
               <a:rPr lang="en-GB" smtClean="0"/>
-              <a:t>06/03/2011</a:t>
+              <a:t>26/03/2011</a:t>
             </a:fld>
             <a:endParaRPr lang="en-GB"/>
           </a:p>
@@ -18228,7 +19104,7 @@
           <a:p>
             <a:fld id="{196A47A2-EFCF-492B-8588-C6F90CC4438D}" type="datetime1">
               <a:rPr lang="en-GB" smtClean="0"/>
-              <a:t>06/03/2011</a:t>
+              <a:t>26/03/2011</a:t>
             </a:fld>
             <a:endParaRPr lang="en-GB"/>
           </a:p>
@@ -18505,7 +19381,7 @@
           <a:p>
             <a:fld id="{29BF1E9D-1B44-4F3F-8F14-FDBD2A019889}" type="datetime1">
               <a:rPr lang="en-GB" smtClean="0"/>
-              <a:t>06/03/2011</a:t>
+              <a:t>26/03/2011</a:t>
             </a:fld>
             <a:endParaRPr lang="en-GB"/>
           </a:p>
@@ -18758,7 +19634,7 @@
           <a:p>
             <a:fld id="{35EE9D4D-9023-427F-A9FA-CAB2D44288B5}" type="datetime1">
               <a:rPr lang="en-GB" smtClean="0"/>
-              <a:t>06/03/2011</a:t>
+              <a:t>26/03/2011</a:t>
             </a:fld>
             <a:endParaRPr lang="en-GB"/>
           </a:p>
@@ -18938,7 +19814,7 @@
           <a:p>
             <a:fld id="{C8398342-058C-4B74-A745-81529AEFEA68}" type="datetime1">
               <a:rPr lang="en-GB" smtClean="0"/>
-              <a:t>06/03/2011</a:t>
+              <a:t>26/03/2011</a:t>
             </a:fld>
             <a:endParaRPr lang="en-GB"/>
           </a:p>
@@ -20695,8 +21571,8 @@
         </p:blipFill>
         <p:spPr>
           <a:xfrm>
-            <a:off x="1202026" y="980728"/>
-            <a:ext cx="6754350" cy="4824536"/>
+            <a:off x="1187624" y="1124744"/>
+            <a:ext cx="6451146" cy="4607961"/>
           </a:xfrm>
           <a:prstGeom prst="rect">
             <a:avLst/>
@@ -21534,7 +22410,7 @@
         </p:blipFill>
         <p:spPr>
           <a:xfrm>
-            <a:off x="4714876" y="2143116"/>
+            <a:off x="4714876" y="1772816"/>
             <a:ext cx="3587750" cy="3009900"/>
           </a:xfrm>
           <a:prstGeom prst="rect">
@@ -21552,6 +22428,169 @@
           </a:effectLst>
         </p:spPr>
       </p:pic>
+      <p:sp>
+        <p:nvSpPr>
+          <p:cNvPr id="2" name="TextBox 1"/>
+          <p:cNvSpPr txBox="1"/>
+          <p:nvPr/>
+        </p:nvSpPr>
+        <p:spPr>
+          <a:xfrm>
+            <a:off x="437845" y="5301208"/>
+            <a:ext cx="7590539" cy="1077218"/>
+          </a:xfrm>
+          <a:prstGeom prst="rect">
+            <a:avLst/>
+          </a:prstGeom>
+          <a:noFill/>
+        </p:spPr>
+        <p:txBody>
+          <a:bodyPr wrap="none" rtlCol="0">
+            <a:spAutoFit/>
+          </a:bodyPr>
+          <a:lstStyle/>
+          <a:p>
+            <a:r>
+              <a:rPr lang="en-GB" sz="1600" dirty="0" err="1">
+                <a:latin typeface="Lucida Console" pitchFamily="49" charset="0"/>
+              </a:rPr>
+              <a:t>mvn</a:t>
+            </a:r>
+            <a:r>
+              <a:rPr lang="en-GB" sz="1600" dirty="0">
+                <a:latin typeface="Lucida Console" pitchFamily="49" charset="0"/>
+              </a:rPr>
+              <a:t> </a:t>
+            </a:r>
+            <a:r>
+              <a:rPr lang="en-GB" sz="1600" dirty="0" err="1">
+                <a:latin typeface="Lucida Console" pitchFamily="49" charset="0"/>
+              </a:rPr>
+              <a:t>archetype:generate</a:t>
+            </a:r>
+            <a:r>
+              <a:rPr lang="en-GB" sz="1600" dirty="0">
+                <a:latin typeface="Lucida Console" pitchFamily="49" charset="0"/>
+              </a:rPr>
+              <a:t>  </a:t>
+            </a:r>
+            <a:r>
+              <a:rPr lang="en-GB" sz="1600" dirty="0" smtClean="0">
+                <a:latin typeface="Lucida Console" pitchFamily="49" charset="0"/>
+              </a:rPr>
+              <a:t>                                   \</a:t>
+            </a:r>
+            <a:endParaRPr lang="en-GB" sz="1600" dirty="0">
+              <a:latin typeface="Lucida Console" pitchFamily="49" charset="0"/>
+            </a:endParaRPr>
+          </a:p>
+          <a:p>
+            <a:r>
+              <a:rPr lang="en-GB" sz="1600" dirty="0">
+                <a:latin typeface="Lucida Console" pitchFamily="49" charset="0"/>
+              </a:rPr>
+              <a:t>    -D </a:t>
+            </a:r>
+            <a:r>
+              <a:rPr lang="en-GB" sz="1600" dirty="0" err="1">
+                <a:latin typeface="Lucida Console" pitchFamily="49" charset="0"/>
+              </a:rPr>
+              <a:t>archetypeCatalog</a:t>
+            </a:r>
+            <a:r>
+              <a:rPr lang="en-GB" sz="1600" dirty="0">
+                <a:latin typeface="Lucida Console" pitchFamily="49" charset="0"/>
+              </a:rPr>
+              <a:t>=http://</a:t>
+            </a:r>
+            <a:r>
+              <a:rPr lang="en-GB" sz="1600" dirty="0" smtClean="0">
+                <a:latin typeface="Lucida Console" pitchFamily="49" charset="0"/>
+              </a:rPr>
+              <a:t>incubator.apache.org/isis   \</a:t>
+            </a:r>
+            <a:endParaRPr lang="en-GB" sz="1600" dirty="0">
+              <a:latin typeface="Lucida Console" pitchFamily="49" charset="0"/>
+            </a:endParaRPr>
+          </a:p>
+          <a:p>
+            <a:r>
+              <a:rPr lang="en-GB" sz="1600" dirty="0">
+                <a:latin typeface="Lucida Console" pitchFamily="49" charset="0"/>
+              </a:rPr>
+              <a:t>    -D </a:t>
+            </a:r>
+            <a:r>
+              <a:rPr lang="en-GB" sz="1600" dirty="0" err="1">
+                <a:latin typeface="Lucida Console" pitchFamily="49" charset="0"/>
+              </a:rPr>
+              <a:t>archetypeGroupId</a:t>
+            </a:r>
+            <a:r>
+              <a:rPr lang="en-GB" sz="1600" dirty="0">
+                <a:latin typeface="Lucida Console" pitchFamily="49" charset="0"/>
+              </a:rPr>
+              <a:t>=</a:t>
+            </a:r>
+            <a:r>
+              <a:rPr lang="en-GB" sz="1600" dirty="0" err="1">
+                <a:latin typeface="Lucida Console" pitchFamily="49" charset="0"/>
+              </a:rPr>
+              <a:t>org.apache.isis.support</a:t>
+            </a:r>
+            <a:r>
+              <a:rPr lang="en-GB" sz="1600" dirty="0">
+                <a:latin typeface="Lucida Console" pitchFamily="49" charset="0"/>
+              </a:rPr>
+              <a:t> </a:t>
+            </a:r>
+            <a:r>
+              <a:rPr lang="en-GB" sz="1600" dirty="0" smtClean="0">
+                <a:latin typeface="Lucida Console" pitchFamily="49" charset="0"/>
+              </a:rPr>
+              <a:t>           \</a:t>
+            </a:r>
+            <a:endParaRPr lang="en-GB" sz="1600" dirty="0">
+              <a:latin typeface="Lucida Console" pitchFamily="49" charset="0"/>
+            </a:endParaRPr>
+          </a:p>
+          <a:p>
+            <a:r>
+              <a:rPr lang="en-GB" sz="1600" dirty="0">
+                <a:latin typeface="Lucida Console" pitchFamily="49" charset="0"/>
+              </a:rPr>
+              <a:t>    -D </a:t>
+            </a:r>
+            <a:r>
+              <a:rPr lang="en-GB" sz="1600" dirty="0" err="1" smtClean="0">
+                <a:latin typeface="Lucida Console" pitchFamily="49" charset="0"/>
+              </a:rPr>
+              <a:t>archetypeArtifactId</a:t>
+            </a:r>
+            <a:r>
+              <a:rPr lang="en-GB" sz="1600" dirty="0" smtClean="0">
+                <a:latin typeface="Lucida Console" pitchFamily="49" charset="0"/>
+              </a:rPr>
+              <a:t>=</a:t>
+            </a:r>
+            <a:r>
+              <a:rPr lang="en-GB" sz="1600" dirty="0" err="1" smtClean="0">
+                <a:latin typeface="Lucida Console" pitchFamily="49" charset="0"/>
+              </a:rPr>
+              <a:t>quickstart</a:t>
+            </a:r>
+            <a:r>
+              <a:rPr lang="en-GB" sz="1600" dirty="0" smtClean="0">
+                <a:latin typeface="Lucida Console" pitchFamily="49" charset="0"/>
+              </a:rPr>
+              <a:t>-archetype</a:t>
+            </a:r>
+            <a:endParaRPr lang="en-GB" sz="1600" dirty="0">
+              <a:latin typeface="Lucida Console" pitchFamily="49" charset="0"/>
+            </a:endParaRPr>
+          </a:p>
+        </p:txBody>
+      </p:sp>
     </p:spTree>
     <p:extLst>
       <p:ext uri="{BB962C8B-B14F-4D97-AF65-F5344CB8AC3E}">
@@ -21769,17 +22808,42 @@
           <a:p>
             <a:pPr lvl="1"/>
             <a:r>
-              <a:rPr lang="en-GB" sz="2400" dirty="0" smtClean="0"/>
-              <a:t>available via Maven</a:t>
-            </a:r>
-          </a:p>
-          <a:p>
-            <a:pPr lvl="1"/>
+              <a:rPr lang="en-GB" sz="2400" dirty="0" smtClean="0">
+                <a:hlinkClick r:id="rId3"/>
+              </a:rPr>
+              <a:t>http</a:t>
+            </a:r>
             <a:r>
               <a:rPr lang="en-GB" sz="2400" dirty="0">
                 <a:hlinkClick r:id="rId3"/>
               </a:rPr>
-              <a:t>http://incubator.apache.org/isis</a:t>
+              <a:t>://</a:t>
+            </a:r>
+            <a:r>
+              <a:rPr lang="en-GB" sz="2400" dirty="0" smtClean="0">
+                <a:hlinkClick r:id="rId3"/>
+              </a:rPr>
+              <a:t>incubator.apache.org/isis</a:t>
+            </a:r>
+            <a:endParaRPr lang="en-GB" sz="2400" dirty="0" smtClean="0"/>
+          </a:p>
+          <a:p>
+            <a:pPr lvl="1"/>
+            <a:r>
+              <a:rPr lang="en-GB" sz="2400" dirty="0" smtClean="0"/>
+              <a:t>how to use Isis’ </a:t>
+            </a:r>
+            <a:r>
+              <a:rPr lang="en-GB" sz="2400" dirty="0" err="1"/>
+              <a:t>quickstart</a:t>
+            </a:r>
+            <a:r>
+              <a:rPr lang="en-GB" sz="2400" dirty="0"/>
+              <a:t> </a:t>
+            </a:r>
+            <a:r>
+              <a:rPr lang="en-GB" sz="2400" dirty="0" smtClean="0"/>
+              <a:t>archetype</a:t>
             </a:r>
             <a:endParaRPr lang="en-GB" sz="2400" dirty="0"/>
           </a:p>

</xml_diff>

<commit_message>
working on the core documentation; recombined the progmodels guides into single doc; recombined the security guides into single doc; removed oai.core.commons.futures package since not used anymore
git-svn-id: https://svn.apache.org/repos/asf/incubator/isis/trunk@1091590 13f79535-47bb-0310-9956-ffa450edef68
</commit_message>
<xml_diff>
--- a/src/site/resources/presentations/IntroducingApacheIsis.pptx
+++ b/src/site/resources/presentations/IntroducingApacheIsis.pptx
@@ -14225,7 +14225,7 @@
           <a:p>
             <a:fld id="{D57AE76F-E67D-4E52-B4AA-F889744E4B89}" type="datetimeFigureOut">
               <a:rPr lang="en-GB" smtClean="0"/>
-              <a:t>26/03/2011</a:t>
+              <a:t>07/04/2011</a:t>
             </a:fld>
             <a:endParaRPr lang="en-GB"/>
           </a:p>
@@ -14395,7 +14395,7 @@
           <a:p>
             <a:fld id="{FC993C7B-7F8B-4B8A-9D83-E8C0718AE1FC}" type="datetimeFigureOut">
               <a:rPr lang="en-GB" smtClean="0"/>
-              <a:t>26/03/2011</a:t>
+              <a:t>07/04/2011</a:t>
             </a:fld>
             <a:endParaRPr lang="en-GB"/>
           </a:p>
@@ -17415,7 +17415,7 @@
           <a:p>
             <a:fld id="{9140DE9F-C34A-4E23-883E-C14682627CCD}" type="datetime1">
               <a:rPr lang="en-GB" smtClean="0"/>
-              <a:t>26/03/2011</a:t>
+              <a:t>07/04/2011</a:t>
             </a:fld>
             <a:endParaRPr lang="en-GB"/>
           </a:p>
@@ -17585,7 +17585,7 @@
           <a:p>
             <a:fld id="{A1B973B2-F141-4671-BF96-850D2453B016}" type="datetime1">
               <a:rPr lang="en-GB" smtClean="0"/>
-              <a:t>26/03/2011</a:t>
+              <a:t>07/04/2011</a:t>
             </a:fld>
             <a:endParaRPr lang="en-GB"/>
           </a:p>
@@ -17765,7 +17765,7 @@
           <a:p>
             <a:fld id="{8524A507-4733-4A6E-83A9-5AB074B59BE5}" type="datetime1">
               <a:rPr lang="en-GB" smtClean="0"/>
-              <a:t>26/03/2011</a:t>
+              <a:t>07/04/2011</a:t>
             </a:fld>
             <a:endParaRPr lang="en-GB"/>
           </a:p>
@@ -17935,7 +17935,7 @@
           <a:p>
             <a:fld id="{ECDC3F93-F704-4AF7-B99C-62E2C5B7C2FE}" type="datetime1">
               <a:rPr lang="en-GB" smtClean="0"/>
-              <a:t>26/03/2011</a:t>
+              <a:t>07/04/2011</a:t>
             </a:fld>
             <a:endParaRPr lang="en-GB"/>
           </a:p>
@@ -18181,7 +18181,7 @@
           <a:p>
             <a:fld id="{56E133CD-AFB4-4FA8-BFBA-3205A0E9B706}" type="datetime1">
               <a:rPr lang="en-GB" smtClean="0"/>
-              <a:t>26/03/2011</a:t>
+              <a:t>07/04/2011</a:t>
             </a:fld>
             <a:endParaRPr lang="en-GB"/>
           </a:p>
@@ -18469,7 +18469,7 @@
           <a:p>
             <a:fld id="{41572393-BB13-42D8-90EB-A2E8E5CB00E1}" type="datetime1">
               <a:rPr lang="en-GB" smtClean="0"/>
-              <a:t>26/03/2011</a:t>
+              <a:t>07/04/2011</a:t>
             </a:fld>
             <a:endParaRPr lang="en-GB"/>
           </a:p>
@@ -18891,7 +18891,7 @@
           <a:p>
             <a:fld id="{EB4D5DAA-7195-4131-B1E3-7C8458845225}" type="datetime1">
               <a:rPr lang="en-GB" smtClean="0"/>
-              <a:t>26/03/2011</a:t>
+              <a:t>07/04/2011</a:t>
             </a:fld>
             <a:endParaRPr lang="en-GB"/>
           </a:p>
@@ -19009,7 +19009,7 @@
           <a:p>
             <a:fld id="{2F851E64-D886-4733-AD8A-CBAB7A97F6C3}" type="datetime1">
               <a:rPr lang="en-GB" smtClean="0"/>
-              <a:t>26/03/2011</a:t>
+              <a:t>07/04/2011</a:t>
             </a:fld>
             <a:endParaRPr lang="en-GB"/>
           </a:p>
@@ -19104,7 +19104,7 @@
           <a:p>
             <a:fld id="{196A47A2-EFCF-492B-8588-C6F90CC4438D}" type="datetime1">
               <a:rPr lang="en-GB" smtClean="0"/>
-              <a:t>26/03/2011</a:t>
+              <a:t>07/04/2011</a:t>
             </a:fld>
             <a:endParaRPr lang="en-GB"/>
           </a:p>
@@ -19381,7 +19381,7 @@
           <a:p>
             <a:fld id="{29BF1E9D-1B44-4F3F-8F14-FDBD2A019889}" type="datetime1">
               <a:rPr lang="en-GB" smtClean="0"/>
-              <a:t>26/03/2011</a:t>
+              <a:t>07/04/2011</a:t>
             </a:fld>
             <a:endParaRPr lang="en-GB"/>
           </a:p>
@@ -19634,7 +19634,7 @@
           <a:p>
             <a:fld id="{35EE9D4D-9023-427F-A9FA-CAB2D44288B5}" type="datetime1">
               <a:rPr lang="en-GB" smtClean="0"/>
-              <a:t>26/03/2011</a:t>
+              <a:t>07/04/2011</a:t>
             </a:fld>
             <a:endParaRPr lang="en-GB"/>
           </a:p>
@@ -19814,7 +19814,7 @@
           <a:p>
             <a:fld id="{C8398342-058C-4B74-A745-81529AEFEA68}" type="datetime1">
               <a:rPr lang="en-GB" smtClean="0"/>
-              <a:t>26/03/2011</a:t>
+              <a:t>07/04/2011</a:t>
             </a:fld>
             <a:endParaRPr lang="en-GB"/>
           </a:p>
@@ -21551,7 +21551,7 @@
       </p:sp>
       <p:pic>
         <p:nvPicPr>
-          <p:cNvPr id="3" name="Picture 2"/>
+          <p:cNvPr id="6" name="Picture 5"/>
           <p:cNvPicPr>
             <a:picLocks noChangeAspect="1"/>
           </p:cNvPicPr>
@@ -21571,8 +21571,8 @@
         </p:blipFill>
         <p:spPr>
           <a:xfrm>
-            <a:off x="1187624" y="1124744"/>
-            <a:ext cx="6451146" cy="4607961"/>
+            <a:off x="1152776" y="1017558"/>
+            <a:ext cx="6803600" cy="4859714"/>
           </a:xfrm>
           <a:prstGeom prst="rect">
             <a:avLst/>

</xml_diff>

<commit_message>
updating hexagonal architecture to split out restful into xhtml & json viewers
git-svn-id: https://svn.apache.org/repos/asf/incubator/isis/trunk@1139764 13f79535-47bb-0310-9956-ffa450edef68
</commit_message>
<xml_diff>
--- a/src/site/resources/presentations/IntroducingApacheIsis.pptx
+++ b/src/site/resources/presentations/IntroducingApacheIsis.pptx
@@ -14225,7 +14225,7 @@
           <a:p>
             <a:fld id="{D57AE76F-E67D-4E52-B4AA-F889744E4B89}" type="datetimeFigureOut">
               <a:rPr lang="en-GB" smtClean="0"/>
-              <a:t>07/04/2011</a:t>
+              <a:t>26/06/2011</a:t>
             </a:fld>
             <a:endParaRPr lang="en-GB"/>
           </a:p>
@@ -14395,7 +14395,7 @@
           <a:p>
             <a:fld id="{FC993C7B-7F8B-4B8A-9D83-E8C0718AE1FC}" type="datetimeFigureOut">
               <a:rPr lang="en-GB" smtClean="0"/>
-              <a:t>07/04/2011</a:t>
+              <a:t>26/06/2011</a:t>
             </a:fld>
             <a:endParaRPr lang="en-GB"/>
           </a:p>
@@ -17415,7 +17415,7 @@
           <a:p>
             <a:fld id="{9140DE9F-C34A-4E23-883E-C14682627CCD}" type="datetime1">
               <a:rPr lang="en-GB" smtClean="0"/>
-              <a:t>07/04/2011</a:t>
+              <a:t>26/06/2011</a:t>
             </a:fld>
             <a:endParaRPr lang="en-GB"/>
           </a:p>
@@ -17585,7 +17585,7 @@
           <a:p>
             <a:fld id="{A1B973B2-F141-4671-BF96-850D2453B016}" type="datetime1">
               <a:rPr lang="en-GB" smtClean="0"/>
-              <a:t>07/04/2011</a:t>
+              <a:t>26/06/2011</a:t>
             </a:fld>
             <a:endParaRPr lang="en-GB"/>
           </a:p>
@@ -17765,7 +17765,7 @@
           <a:p>
             <a:fld id="{8524A507-4733-4A6E-83A9-5AB074B59BE5}" type="datetime1">
               <a:rPr lang="en-GB" smtClean="0"/>
-              <a:t>07/04/2011</a:t>
+              <a:t>26/06/2011</a:t>
             </a:fld>
             <a:endParaRPr lang="en-GB"/>
           </a:p>
@@ -17935,7 +17935,7 @@
           <a:p>
             <a:fld id="{ECDC3F93-F704-4AF7-B99C-62E2C5B7C2FE}" type="datetime1">
               <a:rPr lang="en-GB" smtClean="0"/>
-              <a:t>07/04/2011</a:t>
+              <a:t>26/06/2011</a:t>
             </a:fld>
             <a:endParaRPr lang="en-GB"/>
           </a:p>
@@ -18181,7 +18181,7 @@
           <a:p>
             <a:fld id="{56E133CD-AFB4-4FA8-BFBA-3205A0E9B706}" type="datetime1">
               <a:rPr lang="en-GB" smtClean="0"/>
-              <a:t>07/04/2011</a:t>
+              <a:t>26/06/2011</a:t>
             </a:fld>
             <a:endParaRPr lang="en-GB"/>
           </a:p>
@@ -18469,7 +18469,7 @@
           <a:p>
             <a:fld id="{41572393-BB13-42D8-90EB-A2E8E5CB00E1}" type="datetime1">
               <a:rPr lang="en-GB" smtClean="0"/>
-              <a:t>07/04/2011</a:t>
+              <a:t>26/06/2011</a:t>
             </a:fld>
             <a:endParaRPr lang="en-GB"/>
           </a:p>
@@ -18891,7 +18891,7 @@
           <a:p>
             <a:fld id="{EB4D5DAA-7195-4131-B1E3-7C8458845225}" type="datetime1">
               <a:rPr lang="en-GB" smtClean="0"/>
-              <a:t>07/04/2011</a:t>
+              <a:t>26/06/2011</a:t>
             </a:fld>
             <a:endParaRPr lang="en-GB"/>
           </a:p>
@@ -19009,7 +19009,7 @@
           <a:p>
             <a:fld id="{2F851E64-D886-4733-AD8A-CBAB7A97F6C3}" type="datetime1">
               <a:rPr lang="en-GB" smtClean="0"/>
-              <a:t>07/04/2011</a:t>
+              <a:t>26/06/2011</a:t>
             </a:fld>
             <a:endParaRPr lang="en-GB"/>
           </a:p>
@@ -19104,7 +19104,7 @@
           <a:p>
             <a:fld id="{196A47A2-EFCF-492B-8588-C6F90CC4438D}" type="datetime1">
               <a:rPr lang="en-GB" smtClean="0"/>
-              <a:t>07/04/2011</a:t>
+              <a:t>26/06/2011</a:t>
             </a:fld>
             <a:endParaRPr lang="en-GB"/>
           </a:p>
@@ -19381,7 +19381,7 @@
           <a:p>
             <a:fld id="{29BF1E9D-1B44-4F3F-8F14-FDBD2A019889}" type="datetime1">
               <a:rPr lang="en-GB" smtClean="0"/>
-              <a:t>07/04/2011</a:t>
+              <a:t>26/06/2011</a:t>
             </a:fld>
             <a:endParaRPr lang="en-GB"/>
           </a:p>
@@ -19634,7 +19634,7 @@
           <a:p>
             <a:fld id="{35EE9D4D-9023-427F-A9FA-CAB2D44288B5}" type="datetime1">
               <a:rPr lang="en-GB" smtClean="0"/>
-              <a:t>07/04/2011</a:t>
+              <a:t>26/06/2011</a:t>
             </a:fld>
             <a:endParaRPr lang="en-GB"/>
           </a:p>
@@ -19814,7 +19814,7 @@
           <a:p>
             <a:fld id="{C8398342-058C-4B74-A745-81529AEFEA68}" type="datetime1">
               <a:rPr lang="en-GB" smtClean="0"/>
-              <a:t>07/04/2011</a:t>
+              <a:t>26/06/2011</a:t>
             </a:fld>
             <a:endParaRPr lang="en-GB"/>
           </a:p>
@@ -21551,7 +21551,7 @@
       </p:sp>
       <p:pic>
         <p:nvPicPr>
-          <p:cNvPr id="6" name="Picture 5"/>
+          <p:cNvPr id="2" name="Picture 1"/>
           <p:cNvPicPr>
             <a:picLocks noChangeAspect="1"/>
           </p:cNvPicPr>
@@ -21571,8 +21571,8 @@
         </p:blipFill>
         <p:spPr>
           <a:xfrm>
-            <a:off x="1152776" y="1017558"/>
-            <a:ext cx="6803600" cy="4859714"/>
+            <a:off x="1187624" y="980728"/>
+            <a:ext cx="6768752" cy="4834822"/>
           </a:xfrm>
           <a:prstGeom prst="rect">
             <a:avLst/>
@@ -22436,8 +22436,8 @@
         </p:nvSpPr>
         <p:spPr>
           <a:xfrm>
-            <a:off x="437845" y="5301208"/>
-            <a:ext cx="7590539" cy="1077218"/>
+            <a:off x="1043608" y="5406315"/>
+            <a:ext cx="7297190" cy="923330"/>
           </a:xfrm>
           <a:prstGeom prst="rect">
             <a:avLst/>
@@ -22451,141 +22451,130 @@
           <a:lstStyle/>
           <a:p>
             <a:r>
-              <a:rPr lang="en-GB" sz="1600" dirty="0" err="1">
+              <a:rPr lang="en-GB" dirty="0" err="1">
                 <a:latin typeface="Lucida Console" pitchFamily="49" charset="0"/>
               </a:rPr>
               <a:t>mvn</a:t>
             </a:r>
             <a:r>
-              <a:rPr lang="en-GB" sz="1600" dirty="0">
+              <a:rPr lang="en-GB" dirty="0">
                 <a:latin typeface="Lucida Console" pitchFamily="49" charset="0"/>
               </a:rPr>
               <a:t> </a:t>
             </a:r>
             <a:r>
-              <a:rPr lang="en-GB" sz="1600" dirty="0" err="1">
+              <a:rPr lang="en-GB" dirty="0" err="1">
                 <a:latin typeface="Lucida Console" pitchFamily="49" charset="0"/>
               </a:rPr>
               <a:t>archetype:generate</a:t>
             </a:r>
             <a:r>
-              <a:rPr lang="en-GB" sz="1600" dirty="0">
+              <a:rPr lang="en-GB" dirty="0">
                 <a:latin typeface="Lucida Console" pitchFamily="49" charset="0"/>
               </a:rPr>
               <a:t>  </a:t>
             </a:r>
             <a:r>
-              <a:rPr lang="en-GB" sz="1600" dirty="0" smtClean="0">
+              <a:rPr lang="en-GB" dirty="0" smtClean="0">
                 <a:latin typeface="Lucida Console" pitchFamily="49" charset="0"/>
               </a:rPr>
-              <a:t>                                   \</a:t>
-            </a:r>
-            <a:endParaRPr lang="en-GB" sz="1600" dirty="0">
+              <a:t>                          </a:t>
+            </a:r>
+            <a:r>
+              <a:rPr lang="en-GB" dirty="0" smtClean="0">
+                <a:latin typeface="Lucida Console" pitchFamily="49" charset="0"/>
+              </a:rPr>
+              <a:t>\</a:t>
+            </a:r>
+            <a:endParaRPr lang="en-GB" dirty="0">
               <a:latin typeface="Lucida Console" pitchFamily="49" charset="0"/>
             </a:endParaRPr>
           </a:p>
           <a:p>
             <a:r>
-              <a:rPr lang="en-GB" sz="1600" dirty="0">
+              <a:rPr lang="en-GB" dirty="0" smtClean="0">
+                <a:latin typeface="Lucida Console" pitchFamily="49" charset="0"/>
+              </a:rPr>
+              <a:t>    -</a:t>
+            </a:r>
+            <a:r>
+              <a:rPr lang="en-GB" dirty="0">
+                <a:latin typeface="Lucida Console" pitchFamily="49" charset="0"/>
+              </a:rPr>
+              <a:t>D </a:t>
+            </a:r>
+            <a:r>
+              <a:rPr lang="en-GB" dirty="0" err="1">
+                <a:latin typeface="Lucida Console" pitchFamily="49" charset="0"/>
+              </a:rPr>
+              <a:t>archetypeGroupId</a:t>
+            </a:r>
+            <a:r>
+              <a:rPr lang="en-GB" dirty="0">
+                <a:latin typeface="Lucida Console" pitchFamily="49" charset="0"/>
+              </a:rPr>
+              <a:t>=</a:t>
+            </a:r>
+            <a:r>
+              <a:rPr lang="en-GB" dirty="0" err="1">
+                <a:latin typeface="Lucida Console" pitchFamily="49" charset="0"/>
+              </a:rPr>
+              <a:t>org.apache.isis.support</a:t>
+            </a:r>
+            <a:r>
+              <a:rPr lang="en-GB" dirty="0">
+                <a:latin typeface="Lucida Console" pitchFamily="49" charset="0"/>
+              </a:rPr>
+              <a:t> </a:t>
+            </a:r>
+            <a:r>
+              <a:rPr lang="en-GB" dirty="0" smtClean="0">
+                <a:latin typeface="Lucida Console" pitchFamily="49" charset="0"/>
+              </a:rPr>
+              <a:t>  </a:t>
+            </a:r>
+            <a:r>
+              <a:rPr lang="en-GB" dirty="0" smtClean="0">
+                <a:latin typeface="Lucida Console" pitchFamily="49" charset="0"/>
+              </a:rPr>
+              <a:t>\</a:t>
+            </a:r>
+            <a:endParaRPr lang="en-GB" dirty="0">
+              <a:latin typeface="Lucida Console" pitchFamily="49" charset="0"/>
+            </a:endParaRPr>
+          </a:p>
+          <a:p>
+            <a:r>
+              <a:rPr lang="en-GB" dirty="0">
                 <a:latin typeface="Lucida Console" pitchFamily="49" charset="0"/>
               </a:rPr>
               <a:t>    -D </a:t>
             </a:r>
             <a:r>
-              <a:rPr lang="en-GB" sz="1600" dirty="0" err="1">
+              <a:rPr lang="en-GB" dirty="0" err="1" smtClean="0">
                 <a:latin typeface="Lucida Console" pitchFamily="49" charset="0"/>
               </a:rPr>
-              <a:t>archetypeCatalog</a:t>
-            </a:r>
-            <a:r>
-              <a:rPr lang="en-GB" sz="1600" dirty="0">
-                <a:latin typeface="Lucida Console" pitchFamily="49" charset="0"/>
-              </a:rPr>
-              <a:t>=http://</a:t>
-            </a:r>
-            <a:r>
-              <a:rPr lang="en-GB" sz="1600" dirty="0" smtClean="0">
-                <a:latin typeface="Lucida Console" pitchFamily="49" charset="0"/>
-              </a:rPr>
-              <a:t>incubator.apache.org/isis   \</a:t>
-            </a:r>
-            <a:endParaRPr lang="en-GB" sz="1600" dirty="0">
-              <a:latin typeface="Lucida Console" pitchFamily="49" charset="0"/>
-            </a:endParaRPr>
-          </a:p>
-          <a:p>
-            <a:r>
-              <a:rPr lang="en-GB" sz="1600" dirty="0">
-                <a:latin typeface="Lucida Console" pitchFamily="49" charset="0"/>
-              </a:rPr>
-              <a:t>    -D </a:t>
-            </a:r>
-            <a:r>
-              <a:rPr lang="en-GB" sz="1600" dirty="0" err="1">
-                <a:latin typeface="Lucida Console" pitchFamily="49" charset="0"/>
-              </a:rPr>
-              <a:t>archetypeGroupId</a:t>
-            </a:r>
-            <a:r>
-              <a:rPr lang="en-GB" sz="1600" dirty="0">
+              <a:t>archetypeArtifactId</a:t>
+            </a:r>
+            <a:r>
+              <a:rPr lang="en-GB" dirty="0" smtClean="0">
                 <a:latin typeface="Lucida Console" pitchFamily="49" charset="0"/>
               </a:rPr>
               <a:t>=</a:t>
             </a:r>
             <a:r>
-              <a:rPr lang="en-GB" sz="1600" dirty="0" err="1">
-                <a:latin typeface="Lucida Console" pitchFamily="49" charset="0"/>
-              </a:rPr>
-              <a:t>org.apache.isis.support</a:t>
-            </a:r>
-            <a:r>
-              <a:rPr lang="en-GB" sz="1600" dirty="0">
-                <a:latin typeface="Lucida Console" pitchFamily="49" charset="0"/>
-              </a:rPr>
-              <a:t> </a:t>
-            </a:r>
-            <a:r>
-              <a:rPr lang="en-GB" sz="1600" dirty="0" smtClean="0">
-                <a:latin typeface="Lucida Console" pitchFamily="49" charset="0"/>
-              </a:rPr>
-              <a:t>           \</a:t>
-            </a:r>
-            <a:endParaRPr lang="en-GB" sz="1600" dirty="0">
-              <a:latin typeface="Lucida Console" pitchFamily="49" charset="0"/>
-            </a:endParaRPr>
-          </a:p>
-          <a:p>
-            <a:r>
-              <a:rPr lang="en-GB" sz="1600" dirty="0">
-                <a:latin typeface="Lucida Console" pitchFamily="49" charset="0"/>
-              </a:rPr>
-              <a:t>    -D </a:t>
-            </a:r>
-            <a:r>
-              <a:rPr lang="en-GB" sz="1600" dirty="0" err="1" smtClean="0">
-                <a:latin typeface="Lucida Console" pitchFamily="49" charset="0"/>
-              </a:rPr>
-              <a:t>archetypeArtifactId</a:t>
-            </a:r>
-            <a:r>
-              <a:rPr lang="en-GB" sz="1600" dirty="0" smtClean="0">
-                <a:latin typeface="Lucida Console" pitchFamily="49" charset="0"/>
-              </a:rPr>
-              <a:t>=</a:t>
-            </a:r>
-            <a:r>
-              <a:rPr lang="en-GB" sz="1600" dirty="0" err="1" smtClean="0">
+              <a:rPr lang="en-GB" dirty="0" err="1" smtClean="0">
                 <a:latin typeface="Lucida Console" pitchFamily="49" charset="0"/>
               </a:rPr>
               <a:t>quickstart</a:t>
             </a:r>
             <a:r>
-              <a:rPr lang="en-GB" sz="1600" dirty="0" smtClean="0">
+              <a:rPr lang="en-GB" dirty="0" smtClean="0">
                 <a:latin typeface="Lucida Console" pitchFamily="49" charset="0"/>
               </a:rPr>
               <a:t>-archetype</a:t>
             </a:r>
-            <a:endParaRPr lang="en-GB" sz="1600" dirty="0">
+            <a:endParaRPr lang="en-GB" dirty="0">
               <a:latin typeface="Lucida Console" pitchFamily="49" charset="0"/>
             </a:endParaRPr>
           </a:p>

</xml_diff>